<commit_message>
docs: ✏️ update readme
</commit_message>
<xml_diff>
--- a/doc/introduce.pptx
+++ b/doc/introduce.pptx
@@ -104,6 +104,11 @@
       </a:defRPr>
     </a:lvl9pPr>
   </p:defaultTextStyle>
+  <p:extLst>
+    <p:ext uri="{EFAFB233-063F-42B5-8137-9DF3F51BA10A}">
+      <p15:sldGuideLst xmlns:p15="http://schemas.microsoft.com/office/powerpoint/2012/main"/>
+    </p:ext>
+  </p:extLst>
 </p:presentation>
 </file>
 
@@ -254,7 +259,7 @@
           <a:p>
             <a:fld id="{414311E8-89AB-614A-AC6D-9A334C9AF756}" type="datetimeFigureOut">
               <a:rPr kumimoji="1" lang="zh-TW" altLang="en-US" smtClean="0"/>
-              <a:t>2023/8/24</a:t>
+              <a:t>2023/8/25</a:t>
             </a:fld>
             <a:endParaRPr kumimoji="1" lang="zh-TW" altLang="en-US"/>
           </a:p>
@@ -452,7 +457,7 @@
           <a:p>
             <a:fld id="{414311E8-89AB-614A-AC6D-9A334C9AF756}" type="datetimeFigureOut">
               <a:rPr kumimoji="1" lang="zh-TW" altLang="en-US" smtClean="0"/>
-              <a:t>2023/8/24</a:t>
+              <a:t>2023/8/25</a:t>
             </a:fld>
             <a:endParaRPr kumimoji="1" lang="zh-TW" altLang="en-US"/>
           </a:p>
@@ -660,7 +665,7 @@
           <a:p>
             <a:fld id="{414311E8-89AB-614A-AC6D-9A334C9AF756}" type="datetimeFigureOut">
               <a:rPr kumimoji="1" lang="zh-TW" altLang="en-US" smtClean="0"/>
-              <a:t>2023/8/24</a:t>
+              <a:t>2023/8/25</a:t>
             </a:fld>
             <a:endParaRPr kumimoji="1" lang="zh-TW" altLang="en-US"/>
           </a:p>
@@ -858,7 +863,7 @@
           <a:p>
             <a:fld id="{414311E8-89AB-614A-AC6D-9A334C9AF756}" type="datetimeFigureOut">
               <a:rPr kumimoji="1" lang="zh-TW" altLang="en-US" smtClean="0"/>
-              <a:t>2023/8/24</a:t>
+              <a:t>2023/8/25</a:t>
             </a:fld>
             <a:endParaRPr kumimoji="1" lang="zh-TW" altLang="en-US"/>
           </a:p>
@@ -1133,7 +1138,7 @@
           <a:p>
             <a:fld id="{414311E8-89AB-614A-AC6D-9A334C9AF756}" type="datetimeFigureOut">
               <a:rPr kumimoji="1" lang="zh-TW" altLang="en-US" smtClean="0"/>
-              <a:t>2023/8/24</a:t>
+              <a:t>2023/8/25</a:t>
             </a:fld>
             <a:endParaRPr kumimoji="1" lang="zh-TW" altLang="en-US"/>
           </a:p>
@@ -1398,7 +1403,7 @@
           <a:p>
             <a:fld id="{414311E8-89AB-614A-AC6D-9A334C9AF756}" type="datetimeFigureOut">
               <a:rPr kumimoji="1" lang="zh-TW" altLang="en-US" smtClean="0"/>
-              <a:t>2023/8/24</a:t>
+              <a:t>2023/8/25</a:t>
             </a:fld>
             <a:endParaRPr kumimoji="1" lang="zh-TW" altLang="en-US"/>
           </a:p>
@@ -1810,7 +1815,7 @@
           <a:p>
             <a:fld id="{414311E8-89AB-614A-AC6D-9A334C9AF756}" type="datetimeFigureOut">
               <a:rPr kumimoji="1" lang="zh-TW" altLang="en-US" smtClean="0"/>
-              <a:t>2023/8/24</a:t>
+              <a:t>2023/8/25</a:t>
             </a:fld>
             <a:endParaRPr kumimoji="1" lang="zh-TW" altLang="en-US"/>
           </a:p>
@@ -1951,7 +1956,7 @@
           <a:p>
             <a:fld id="{414311E8-89AB-614A-AC6D-9A334C9AF756}" type="datetimeFigureOut">
               <a:rPr kumimoji="1" lang="zh-TW" altLang="en-US" smtClean="0"/>
-              <a:t>2023/8/24</a:t>
+              <a:t>2023/8/25</a:t>
             </a:fld>
             <a:endParaRPr kumimoji="1" lang="zh-TW" altLang="en-US"/>
           </a:p>
@@ -2064,7 +2069,7 @@
           <a:p>
             <a:fld id="{414311E8-89AB-614A-AC6D-9A334C9AF756}" type="datetimeFigureOut">
               <a:rPr kumimoji="1" lang="zh-TW" altLang="en-US" smtClean="0"/>
-              <a:t>2023/8/24</a:t>
+              <a:t>2023/8/25</a:t>
             </a:fld>
             <a:endParaRPr kumimoji="1" lang="zh-TW" altLang="en-US"/>
           </a:p>
@@ -2375,7 +2380,7 @@
           <a:p>
             <a:fld id="{414311E8-89AB-614A-AC6D-9A334C9AF756}" type="datetimeFigureOut">
               <a:rPr kumimoji="1" lang="zh-TW" altLang="en-US" smtClean="0"/>
-              <a:t>2023/8/24</a:t>
+              <a:t>2023/8/25</a:t>
             </a:fld>
             <a:endParaRPr kumimoji="1" lang="zh-TW" altLang="en-US"/>
           </a:p>
@@ -2663,7 +2668,7 @@
           <a:p>
             <a:fld id="{414311E8-89AB-614A-AC6D-9A334C9AF756}" type="datetimeFigureOut">
               <a:rPr kumimoji="1" lang="zh-TW" altLang="en-US" smtClean="0"/>
-              <a:t>2023/8/24</a:t>
+              <a:t>2023/8/25</a:t>
             </a:fld>
             <a:endParaRPr kumimoji="1" lang="zh-TW" altLang="en-US"/>
           </a:p>
@@ -2904,7 +2909,7 @@
           <a:p>
             <a:fld id="{414311E8-89AB-614A-AC6D-9A334C9AF756}" type="datetimeFigureOut">
               <a:rPr kumimoji="1" lang="zh-TW" altLang="en-US" smtClean="0"/>
-              <a:t>2023/8/24</a:t>
+              <a:t>2023/8/25</a:t>
             </a:fld>
             <a:endParaRPr kumimoji="1" lang="zh-TW" altLang="en-US"/>
           </a:p>
@@ -4369,32 +4374,239 @@
           </a:p>
         </p:txBody>
       </p:sp>
+      <p:grpSp>
+        <p:nvGrpSpPr>
+          <p:cNvPr id="26" name="群組 25">
+            <a:extLst>
+              <a:ext uri="{FF2B5EF4-FFF2-40B4-BE49-F238E27FC236}">
+                <a16:creationId xmlns:a16="http://schemas.microsoft.com/office/drawing/2014/main" id="{2210B732-595D-8C23-4CC4-69BE8BE0E41A}"/>
+              </a:ext>
+            </a:extLst>
+          </p:cNvPr>
+          <p:cNvGrpSpPr/>
+          <p:nvPr/>
+        </p:nvGrpSpPr>
+        <p:grpSpPr>
+          <a:xfrm>
+            <a:off x="4034120" y="603635"/>
+            <a:ext cx="4735788" cy="4137293"/>
+            <a:chOff x="5472708" y="815508"/>
+            <a:chExt cx="4735788" cy="4137293"/>
+          </a:xfrm>
+        </p:grpSpPr>
+        <p:grpSp>
+          <p:nvGrpSpPr>
+            <p:cNvPr id="22" name="群組 21">
+              <a:extLst>
+                <a:ext uri="{FF2B5EF4-FFF2-40B4-BE49-F238E27FC236}">
+                  <a16:creationId xmlns:a16="http://schemas.microsoft.com/office/drawing/2014/main" id="{008FF1D3-B371-FFD9-D68F-3C7374C619AA}"/>
+                </a:ext>
+              </a:extLst>
+            </p:cNvPr>
+            <p:cNvGrpSpPr/>
+            <p:nvPr/>
+          </p:nvGrpSpPr>
+          <p:grpSpPr>
+            <a:xfrm>
+              <a:off x="5472708" y="1500986"/>
+              <a:ext cx="4735788" cy="3451815"/>
+              <a:chOff x="5226538" y="1099383"/>
+              <a:chExt cx="4735788" cy="3451815"/>
+            </a:xfrm>
+          </p:grpSpPr>
+          <p:pic>
+            <p:nvPicPr>
+              <p:cNvPr id="17" name="圖片 16" descr="一張含有 文字, 螢幕擷取畫面 的圖片&#10;&#10;自動產生的描述">
+                <a:extLst>
+                  <a:ext uri="{FF2B5EF4-FFF2-40B4-BE49-F238E27FC236}">
+                    <a16:creationId xmlns:a16="http://schemas.microsoft.com/office/drawing/2014/main" id="{0A179718-38A2-8DCC-140F-5C028521779A}"/>
+                  </a:ext>
+                </a:extLst>
+              </p:cNvPr>
+              <p:cNvPicPr>
+                <a:picLocks noChangeAspect="1"/>
+              </p:cNvPicPr>
+              <p:nvPr/>
+            </p:nvPicPr>
+            <p:blipFill rotWithShape="1">
+              <a:blip r:embed="rId2"/>
+              <a:srcRect b="35802"/>
+              <a:stretch/>
+            </p:blipFill>
+            <p:spPr>
+              <a:xfrm>
+                <a:off x="5226538" y="1147089"/>
+                <a:ext cx="2282400" cy="3404109"/>
+              </a:xfrm>
+              <a:prstGeom prst="rect">
+                <a:avLst/>
+              </a:prstGeom>
+            </p:spPr>
+          </p:pic>
+          <p:pic>
+            <p:nvPicPr>
+              <p:cNvPr id="18" name="圖片 17" descr="一張含有 文字, 螢幕擷取畫面 的圖片&#10;&#10;自動產生的描述">
+                <a:extLst>
+                  <a:ext uri="{FF2B5EF4-FFF2-40B4-BE49-F238E27FC236}">
+                    <a16:creationId xmlns:a16="http://schemas.microsoft.com/office/drawing/2014/main" id="{3ABA0862-F7F3-5336-5170-01751694C9C3}"/>
+                  </a:ext>
+                </a:extLst>
+              </p:cNvPr>
+              <p:cNvPicPr>
+                <a:picLocks noChangeAspect="1"/>
+              </p:cNvPicPr>
+              <p:nvPr/>
+            </p:nvPicPr>
+            <p:blipFill rotWithShape="1">
+              <a:blip r:embed="rId3"/>
+              <a:srcRect t="65345"/>
+              <a:stretch/>
+            </p:blipFill>
+            <p:spPr>
+              <a:xfrm>
+                <a:off x="7679926" y="1099383"/>
+                <a:ext cx="2281532" cy="1836887"/>
+              </a:xfrm>
+              <a:prstGeom prst="rect">
+                <a:avLst/>
+              </a:prstGeom>
+            </p:spPr>
+          </p:pic>
+          <p:pic>
+            <p:nvPicPr>
+              <p:cNvPr id="20" name="圖片 19" descr="一張含有 文字, 字型, 螢幕擷取畫面, 數字 的圖片&#10;&#10;自動產生的描述">
+                <a:extLst>
+                  <a:ext uri="{FF2B5EF4-FFF2-40B4-BE49-F238E27FC236}">
+                    <a16:creationId xmlns:a16="http://schemas.microsoft.com/office/drawing/2014/main" id="{0B2712AD-888E-929C-AEA5-F107577E885B}"/>
+                  </a:ext>
+                </a:extLst>
+              </p:cNvPr>
+              <p:cNvPicPr>
+                <a:picLocks noChangeAspect="1"/>
+              </p:cNvPicPr>
+              <p:nvPr/>
+            </p:nvPicPr>
+            <p:blipFill>
+              <a:blip r:embed="rId4"/>
+              <a:stretch>
+                <a:fillRect/>
+              </a:stretch>
+            </p:blipFill>
+            <p:spPr>
+              <a:xfrm>
+                <a:off x="7679926" y="3039622"/>
+                <a:ext cx="2282400" cy="741588"/>
+              </a:xfrm>
+              <a:prstGeom prst="rect">
+                <a:avLst/>
+              </a:prstGeom>
+            </p:spPr>
+          </p:pic>
+        </p:grpSp>
+        <p:pic>
+          <p:nvPicPr>
+            <p:cNvPr id="25" name="圖片 24" descr="一張含有 文字, 螢幕擷取畫面, 白色, 字型 的圖片&#10;&#10;自動產生的描述">
+              <a:extLst>
+                <a:ext uri="{FF2B5EF4-FFF2-40B4-BE49-F238E27FC236}">
+                  <a16:creationId xmlns:a16="http://schemas.microsoft.com/office/drawing/2014/main" id="{242CDBDE-AF1B-46B2-11CA-9E33659BF95F}"/>
+                </a:ext>
+              </a:extLst>
+            </p:cNvPr>
+            <p:cNvPicPr>
+              <a:picLocks noChangeAspect="1"/>
+            </p:cNvPicPr>
+            <p:nvPr/>
+          </p:nvPicPr>
+          <p:blipFill>
+            <a:blip r:embed="rId5"/>
+            <a:stretch>
+              <a:fillRect/>
+            </a:stretch>
+          </p:blipFill>
+          <p:spPr>
+            <a:xfrm>
+              <a:off x="5759207" y="815508"/>
+              <a:ext cx="4162790" cy="651750"/>
+            </a:xfrm>
+            <a:prstGeom prst="rect">
+              <a:avLst/>
+            </a:prstGeom>
+          </p:spPr>
+        </p:pic>
+      </p:grpSp>
+      <p:sp>
+        <p:nvSpPr>
+          <p:cNvPr id="7" name="文字方塊 6">
+            <a:extLst>
+              <a:ext uri="{FF2B5EF4-FFF2-40B4-BE49-F238E27FC236}">
+                <a16:creationId xmlns:a16="http://schemas.microsoft.com/office/drawing/2014/main" id="{1BCB4DF1-9847-A9E7-6F25-7C234586E2BB}"/>
+              </a:ext>
+            </a:extLst>
+          </p:cNvPr>
+          <p:cNvSpPr txBox="1"/>
+          <p:nvPr/>
+        </p:nvSpPr>
+        <p:spPr>
+          <a:xfrm>
+            <a:off x="7506891" y="456065"/>
+            <a:ext cx="1338349" cy="307777"/>
+          </a:xfrm>
+          <a:prstGeom prst="rect">
+            <a:avLst/>
+          </a:prstGeom>
+          <a:noFill/>
+        </p:spPr>
+        <p:txBody>
+          <a:bodyPr wrap="square">
+            <a:spAutoFit/>
+          </a:bodyPr>
+          <a:lstStyle/>
+          <a:p>
+            <a:pPr marL="7938" algn="ctr"/>
+            <a:r>
+              <a:rPr kumimoji="1" lang="zh-TW" altLang="en-US" sz="1400" dirty="0">
+                <a:solidFill>
+                  <a:srgbClr val="A16B40"/>
+                </a:solidFill>
+                <a:latin typeface="Heiti TC Medium" pitchFamily="2" charset="-128"/>
+                <a:ea typeface="Heiti TC Medium" pitchFamily="2" charset="-128"/>
+              </a:rPr>
+              <a:t>篩選 分組</a:t>
+            </a:r>
+            <a:endParaRPr kumimoji="1" lang="en-US" altLang="zh-TW" sz="1400" dirty="0">
+              <a:solidFill>
+                <a:srgbClr val="A16B40"/>
+              </a:solidFill>
+              <a:latin typeface="Heiti TC Medium" pitchFamily="2" charset="-128"/>
+              <a:ea typeface="Heiti TC Medium" pitchFamily="2" charset="-128"/>
+            </a:endParaRPr>
+          </a:p>
+        </p:txBody>
+      </p:sp>
       <p:pic>
         <p:nvPicPr>
-          <p:cNvPr id="5" name="內容版面配置區 4" descr="一張含有 文字, 螢幕擷取畫面, 行動電話, 行動裝置 的圖片&#10;&#10;自動產生的描述">
-            <a:extLst>
-              <a:ext uri="{FF2B5EF4-FFF2-40B4-BE49-F238E27FC236}">
-                <a16:creationId xmlns:a16="http://schemas.microsoft.com/office/drawing/2014/main" id="{A5A6A5D8-D54D-ED44-A33D-B50147089060}"/>
+          <p:cNvPr id="19" name="圖片 18" descr="一張含有 文字, 螢幕擷取畫面, 行動電話, 行動裝置 的圖片&#10;&#10;自動產生的描述">
+            <a:extLst>
+              <a:ext uri="{FF2B5EF4-FFF2-40B4-BE49-F238E27FC236}">
+                <a16:creationId xmlns:a16="http://schemas.microsoft.com/office/drawing/2014/main" id="{09620B8B-7BA3-4217-0BA2-FE12D3053A0D}"/>
               </a:ext>
             </a:extLst>
           </p:cNvPr>
           <p:cNvPicPr>
-            <a:picLocks noGrp="1" noChangeAspect="1"/>
+            <a:picLocks noChangeAspect="1"/>
           </p:cNvPicPr>
-          <p:nvPr>
-            <p:ph idx="1"/>
-          </p:nvPr>
+          <p:nvPr/>
         </p:nvPicPr>
         <p:blipFill>
-          <a:blip r:embed="rId2"/>
+          <a:blip r:embed="rId6"/>
           <a:stretch>
             <a:fillRect/>
           </a:stretch>
         </p:blipFill>
         <p:spPr>
           <a:xfrm>
-            <a:off x="823777" y="431594"/>
-            <a:ext cx="2743748" cy="5571066"/>
+            <a:off x="821460" y="430291"/>
+            <a:ext cx="2748633" cy="5569200"/>
           </a:xfrm>
           <a:prstGeom prst="rect">
             <a:avLst/>
@@ -4403,10 +4615,10 @@
       </p:pic>
       <p:grpSp>
         <p:nvGrpSpPr>
-          <p:cNvPr id="15" name="群組 14">
-            <a:extLst>
-              <a:ext uri="{FF2B5EF4-FFF2-40B4-BE49-F238E27FC236}">
-                <a16:creationId xmlns:a16="http://schemas.microsoft.com/office/drawing/2014/main" id="{88395908-7051-789D-02C4-CFC495E933F3}"/>
+          <p:cNvPr id="31" name="群組 30">
+            <a:extLst>
+              <a:ext uri="{FF2B5EF4-FFF2-40B4-BE49-F238E27FC236}">
+                <a16:creationId xmlns:a16="http://schemas.microsoft.com/office/drawing/2014/main" id="{19663807-CF58-0757-6DBE-1177B0F530DD}"/>
               </a:ext>
             </a:extLst>
           </p:cNvPr>
@@ -4423,10 +4635,10 @@
         </p:grpSpPr>
         <p:pic>
           <p:nvPicPr>
-            <p:cNvPr id="13" name="圖片 12" descr="一張含有 文字, 卡通 的圖片&#10;&#10;自動產生的描述">
+            <p:cNvPr id="32" name="圖片 31" descr="一張含有 文字, 卡通 的圖片&#10;&#10;自動產生的描述">
               <a:extLst>
                 <a:ext uri="{FF2B5EF4-FFF2-40B4-BE49-F238E27FC236}">
-                  <a16:creationId xmlns:a16="http://schemas.microsoft.com/office/drawing/2014/main" id="{EE0687D2-4749-0E10-A19F-6484A0D72049}"/>
+                  <a16:creationId xmlns:a16="http://schemas.microsoft.com/office/drawing/2014/main" id="{C8C8B899-C772-DDD5-3E03-2A1B172BC38E}"/>
                 </a:ext>
               </a:extLst>
             </p:cNvPr>
@@ -4436,7 +4648,7 @@
             <p:nvPr/>
           </p:nvPicPr>
           <p:blipFill>
-            <a:blip r:embed="rId3"/>
+            <a:blip r:embed="rId7"/>
             <a:stretch>
               <a:fillRect/>
             </a:stretch>
@@ -4460,10 +4672,10 @@
         </p:pic>
         <p:sp>
           <p:nvSpPr>
-            <p:cNvPr id="14" name="文字方塊 13">
+            <p:cNvPr id="33" name="文字方塊 32">
               <a:extLst>
                 <a:ext uri="{FF2B5EF4-FFF2-40B4-BE49-F238E27FC236}">
-                  <a16:creationId xmlns:a16="http://schemas.microsoft.com/office/drawing/2014/main" id="{BA7D07E3-25E4-A44B-0BF4-866F8F00AA74}"/>
+                  <a16:creationId xmlns:a16="http://schemas.microsoft.com/office/drawing/2014/main" id="{F24367B1-2E54-0E2C-2959-8600707EC533}"/>
                 </a:ext>
               </a:extLst>
             </p:cNvPr>
@@ -4592,183 +4804,16 @@
                 </a:rPr>
                 <a:t>收集食材</a:t>
               </a:r>
-              <a:endParaRPr kumimoji="1" lang="zh-TW" altLang="en-US" dirty="0">
-                <a:solidFill>
-                  <a:srgbClr val="A16B40"/>
-                </a:solidFill>
-                <a:latin typeface="Heiti TC Medium" pitchFamily="2" charset="-128"/>
-                <a:ea typeface="Heiti TC Medium" pitchFamily="2" charset="-128"/>
-              </a:endParaRPr>
             </a:p>
           </p:txBody>
         </p:sp>
       </p:grpSp>
-      <p:grpSp>
-        <p:nvGrpSpPr>
-          <p:cNvPr id="26" name="群組 25">
-            <a:extLst>
-              <a:ext uri="{FF2B5EF4-FFF2-40B4-BE49-F238E27FC236}">
-                <a16:creationId xmlns:a16="http://schemas.microsoft.com/office/drawing/2014/main" id="{2210B732-595D-8C23-4CC4-69BE8BE0E41A}"/>
-              </a:ext>
-            </a:extLst>
-          </p:cNvPr>
-          <p:cNvGrpSpPr/>
-          <p:nvPr/>
-        </p:nvGrpSpPr>
-        <p:grpSpPr>
-          <a:xfrm>
-            <a:off x="4034120" y="603635"/>
-            <a:ext cx="4735788" cy="4137293"/>
-            <a:chOff x="5472708" y="815508"/>
-            <a:chExt cx="4735788" cy="4137293"/>
-          </a:xfrm>
-        </p:grpSpPr>
-        <p:grpSp>
-          <p:nvGrpSpPr>
-            <p:cNvPr id="22" name="群組 21">
-              <a:extLst>
-                <a:ext uri="{FF2B5EF4-FFF2-40B4-BE49-F238E27FC236}">
-                  <a16:creationId xmlns:a16="http://schemas.microsoft.com/office/drawing/2014/main" id="{008FF1D3-B371-FFD9-D68F-3C7374C619AA}"/>
-                </a:ext>
-              </a:extLst>
-            </p:cNvPr>
-            <p:cNvGrpSpPr/>
-            <p:nvPr/>
-          </p:nvGrpSpPr>
-          <p:grpSpPr>
-            <a:xfrm>
-              <a:off x="5472708" y="1500986"/>
-              <a:ext cx="4735788" cy="3451815"/>
-              <a:chOff x="5226538" y="1099383"/>
-              <a:chExt cx="4735788" cy="3451815"/>
-            </a:xfrm>
-          </p:grpSpPr>
-          <p:pic>
-            <p:nvPicPr>
-              <p:cNvPr id="17" name="圖片 16" descr="一張含有 文字, 螢幕擷取畫面 的圖片&#10;&#10;自動產生的描述">
-                <a:extLst>
-                  <a:ext uri="{FF2B5EF4-FFF2-40B4-BE49-F238E27FC236}">
-                    <a16:creationId xmlns:a16="http://schemas.microsoft.com/office/drawing/2014/main" id="{0A179718-38A2-8DCC-140F-5C028521779A}"/>
-                  </a:ext>
-                </a:extLst>
-              </p:cNvPr>
-              <p:cNvPicPr>
-                <a:picLocks noChangeAspect="1"/>
-              </p:cNvPicPr>
-              <p:nvPr/>
-            </p:nvPicPr>
-            <p:blipFill rotWithShape="1">
-              <a:blip r:embed="rId4"/>
-              <a:srcRect b="35802"/>
-              <a:stretch/>
-            </p:blipFill>
-            <p:spPr>
-              <a:xfrm>
-                <a:off x="5226538" y="1147089"/>
-                <a:ext cx="2282400" cy="3404109"/>
-              </a:xfrm>
-              <a:prstGeom prst="rect">
-                <a:avLst/>
-              </a:prstGeom>
-            </p:spPr>
-          </p:pic>
-          <p:pic>
-            <p:nvPicPr>
-              <p:cNvPr id="18" name="圖片 17" descr="一張含有 文字, 螢幕擷取畫面 的圖片&#10;&#10;自動產生的描述">
-                <a:extLst>
-                  <a:ext uri="{FF2B5EF4-FFF2-40B4-BE49-F238E27FC236}">
-                    <a16:creationId xmlns:a16="http://schemas.microsoft.com/office/drawing/2014/main" id="{3ABA0862-F7F3-5336-5170-01751694C9C3}"/>
-                  </a:ext>
-                </a:extLst>
-              </p:cNvPr>
-              <p:cNvPicPr>
-                <a:picLocks noChangeAspect="1"/>
-              </p:cNvPicPr>
-              <p:nvPr/>
-            </p:nvPicPr>
-            <p:blipFill rotWithShape="1">
-              <a:blip r:embed="rId5"/>
-              <a:srcRect t="65345"/>
-              <a:stretch/>
-            </p:blipFill>
-            <p:spPr>
-              <a:xfrm>
-                <a:off x="7679926" y="1099383"/>
-                <a:ext cx="2281532" cy="1836887"/>
-              </a:xfrm>
-              <a:prstGeom prst="rect">
-                <a:avLst/>
-              </a:prstGeom>
-            </p:spPr>
-          </p:pic>
-          <p:pic>
-            <p:nvPicPr>
-              <p:cNvPr id="20" name="圖片 19" descr="一張含有 文字, 字型, 螢幕擷取畫面, 數字 的圖片&#10;&#10;自動產生的描述">
-                <a:extLst>
-                  <a:ext uri="{FF2B5EF4-FFF2-40B4-BE49-F238E27FC236}">
-                    <a16:creationId xmlns:a16="http://schemas.microsoft.com/office/drawing/2014/main" id="{0B2712AD-888E-929C-AEA5-F107577E885B}"/>
-                  </a:ext>
-                </a:extLst>
-              </p:cNvPr>
-              <p:cNvPicPr>
-                <a:picLocks noChangeAspect="1"/>
-              </p:cNvPicPr>
-              <p:nvPr/>
-            </p:nvPicPr>
-            <p:blipFill>
-              <a:blip r:embed="rId6"/>
-              <a:stretch>
-                <a:fillRect/>
-              </a:stretch>
-            </p:blipFill>
-            <p:spPr>
-              <a:xfrm>
-                <a:off x="7679926" y="3039622"/>
-                <a:ext cx="2282400" cy="741588"/>
-              </a:xfrm>
-              <a:prstGeom prst="rect">
-                <a:avLst/>
-              </a:prstGeom>
-            </p:spPr>
-          </p:pic>
-        </p:grpSp>
-        <p:pic>
-          <p:nvPicPr>
-            <p:cNvPr id="25" name="圖片 24" descr="一張含有 文字, 螢幕擷取畫面, 白色, 字型 的圖片&#10;&#10;自動產生的描述">
-              <a:extLst>
-                <a:ext uri="{FF2B5EF4-FFF2-40B4-BE49-F238E27FC236}">
-                  <a16:creationId xmlns:a16="http://schemas.microsoft.com/office/drawing/2014/main" id="{242CDBDE-AF1B-46B2-11CA-9E33659BF95F}"/>
-                </a:ext>
-              </a:extLst>
-            </p:cNvPr>
-            <p:cNvPicPr>
-              <a:picLocks noChangeAspect="1"/>
-            </p:cNvPicPr>
-            <p:nvPr/>
-          </p:nvPicPr>
-          <p:blipFill>
-            <a:blip r:embed="rId7"/>
-            <a:stretch>
-              <a:fillRect/>
-            </a:stretch>
-          </p:blipFill>
-          <p:spPr>
-            <a:xfrm>
-              <a:off x="5759207" y="815508"/>
-              <a:ext cx="4162790" cy="651750"/>
-            </a:xfrm>
-            <a:prstGeom prst="rect">
-              <a:avLst/>
-            </a:prstGeom>
-          </p:spPr>
-        </p:pic>
-      </p:grpSp>
       <p:pic>
         <p:nvPicPr>
-          <p:cNvPr id="38" name="圖片 37" descr="一張含有 文字, 螢幕擷取畫面, 行動電話, 多媒體 的圖片&#10;&#10;自動產生的描述">
-            <a:extLst>
-              <a:ext uri="{FF2B5EF4-FFF2-40B4-BE49-F238E27FC236}">
-                <a16:creationId xmlns:a16="http://schemas.microsoft.com/office/drawing/2014/main" id="{4D0FE406-A1FC-A0F9-B7B6-1BE573883817}"/>
+          <p:cNvPr id="35" name="圖片 34" descr="一張含有 螢幕擷取畫面, 多媒體, 作業系統, 軟體 的圖片&#10;&#10;自動產生的描述">
+            <a:extLst>
+              <a:ext uri="{FF2B5EF4-FFF2-40B4-BE49-F238E27FC236}">
+                <a16:creationId xmlns:a16="http://schemas.microsoft.com/office/drawing/2014/main" id="{8704F2D7-D9C1-975F-1BEA-A5C6C2892765}"/>
               </a:ext>
             </a:extLst>
           </p:cNvPr>
@@ -4784,9 +4829,9 @@
           </a:stretch>
         </p:blipFill>
         <p:spPr>
-          <a:xfrm rot="1020093">
-            <a:off x="8474851" y="1063495"/>
-            <a:ext cx="2584115" cy="5232299"/>
+          <a:xfrm rot="1211875">
+            <a:off x="8632234" y="1228589"/>
+            <a:ext cx="2581619" cy="5230800"/>
           </a:xfrm>
           <a:prstGeom prst="rect">
             <a:avLst/>

</xml_diff>

<commit_message>
docs: ✏️ update cover
</commit_message>
<xml_diff>
--- a/doc/introduce.pptx
+++ b/doc/introduce.pptx
@@ -8,6 +8,7 @@
     <p:sldId id="258" r:id="rId2"/>
     <p:sldId id="257" r:id="rId3"/>
     <p:sldId id="259" r:id="rId4"/>
+    <p:sldId id="260" r:id="rId5"/>
   </p:sldIdLst>
   <p:sldSz cx="12192000" cy="6858000"/>
   <p:notesSz cx="6858000" cy="9144000"/>
@@ -8267,6 +8268,1525 @@
 </p:sld>
 </file>
 
+<file path=ppt/slides/slide4.xml><?xml version="1.0" encoding="utf-8"?>
+<p:sld xmlns:a="http://schemas.openxmlformats.org/drawingml/2006/main" xmlns:r="http://schemas.openxmlformats.org/officeDocument/2006/relationships" xmlns:p="http://schemas.openxmlformats.org/presentationml/2006/main">
+  <p:cSld>
+    <p:bg>
+      <p:bgPr>
+        <a:solidFill>
+          <a:schemeClr val="bg1"/>
+        </a:solidFill>
+        <a:effectLst/>
+      </p:bgPr>
+    </p:bg>
+    <p:spTree>
+      <p:nvGrpSpPr>
+        <p:cNvPr id="1" name=""/>
+        <p:cNvGrpSpPr/>
+        <p:nvPr/>
+      </p:nvGrpSpPr>
+      <p:grpSpPr>
+        <a:xfrm>
+          <a:off x="0" y="0"/>
+          <a:ext cx="0" cy="0"/>
+          <a:chOff x="0" y="0"/>
+          <a:chExt cx="0" cy="0"/>
+        </a:xfrm>
+      </p:grpSpPr>
+      <p:sp useBgFill="1">
+        <p:nvSpPr>
+          <p:cNvPr id="12" name="Rectangle 11">
+            <a:extLst>
+              <a:ext uri="{FF2B5EF4-FFF2-40B4-BE49-F238E27FC236}">
+                <a16:creationId xmlns:a16="http://schemas.microsoft.com/office/drawing/2014/main" id="{854ECEBE-9353-406C-9313-02A517A310EF}"/>
+              </a:ext>
+              <a:ext uri="{C183D7F6-B498-43B3-948B-1728B52AA6E4}">
+                <adec:decorative xmlns:adec="http://schemas.microsoft.com/office/drawing/2017/decorative" val="1"/>
+              </a:ext>
+            </a:extLst>
+          </p:cNvPr>
+          <p:cNvSpPr>
+            <a:spLocks noGrp="1" noRot="1" noChangeAspect="1" noMove="1" noResize="1" noEditPoints="1" noAdjustHandles="1" noChangeArrowheads="1" noChangeShapeType="1" noTextEdit="1"/>
+          </p:cNvSpPr>
+          <p:nvPr>
+            <p:extLst>
+              <p:ext uri="{386F3935-93C4-4BCD-93E2-E3B085C9AB24}">
+                <p16:designElem xmlns:p16="http://schemas.microsoft.com/office/powerpoint/2015/main" val="1"/>
+              </p:ext>
+            </p:extLst>
+          </p:nvPr>
+        </p:nvSpPr>
+        <p:spPr>
+          <a:xfrm>
+            <a:off x="0" y="0"/>
+            <a:ext cx="12192000" cy="6858000"/>
+          </a:xfrm>
+          <a:prstGeom prst="rect">
+            <a:avLst/>
+          </a:prstGeom>
+          <a:solidFill>
+            <a:schemeClr val="bg2">
+              <a:tint val="95000"/>
+              <a:satMod val="170000"/>
+            </a:schemeClr>
+          </a:solidFill>
+          <a:ln>
+            <a:noFill/>
+          </a:ln>
+        </p:spPr>
+        <p:style>
+          <a:lnRef idx="2">
+            <a:schemeClr val="accent1">
+              <a:shade val="50000"/>
+            </a:schemeClr>
+          </a:lnRef>
+          <a:fillRef idx="1">
+            <a:schemeClr val="accent1"/>
+          </a:fillRef>
+          <a:effectRef idx="0">
+            <a:schemeClr val="accent1"/>
+          </a:effectRef>
+          <a:fontRef idx="minor">
+            <a:schemeClr val="lt1"/>
+          </a:fontRef>
+        </p:style>
+        <p:txBody>
+          <a:bodyPr rtlCol="0" anchor="ctr"/>
+          <a:lstStyle/>
+          <a:p>
+            <a:pPr algn="ctr"/>
+            <a:endParaRPr lang="en-US">
+              <a:solidFill>
+                <a:prstClr val="white"/>
+              </a:solidFill>
+              <a:latin typeface="Meiryo"/>
+            </a:endParaRPr>
+          </a:p>
+        </p:txBody>
+      </p:sp>
+      <p:sp>
+        <p:nvSpPr>
+          <p:cNvPr id="14" name="Freeform: Shape 13">
+            <a:extLst>
+              <a:ext uri="{FF2B5EF4-FFF2-40B4-BE49-F238E27FC236}">
+                <a16:creationId xmlns:a16="http://schemas.microsoft.com/office/drawing/2014/main" id="{71A74C97-ECC4-4C3A-988A-A72C1F8BBAC8}"/>
+              </a:ext>
+              <a:ext uri="{C183D7F6-B498-43B3-948B-1728B52AA6E4}">
+                <adec:decorative xmlns:adec="http://schemas.microsoft.com/office/drawing/2017/decorative" val="1"/>
+              </a:ext>
+            </a:extLst>
+          </p:cNvPr>
+          <p:cNvSpPr>
+            <a:spLocks noGrp="1" noRot="1" noChangeAspect="1" noMove="1" noResize="1" noEditPoints="1" noAdjustHandles="1" noChangeArrowheads="1" noChangeShapeType="1" noTextEdit="1"/>
+          </p:cNvSpPr>
+          <p:nvPr>
+            <p:extLst>
+              <p:ext uri="{386F3935-93C4-4BCD-93E2-E3B085C9AB24}">
+                <p16:designElem xmlns:p16="http://schemas.microsoft.com/office/powerpoint/2015/main" val="1"/>
+              </p:ext>
+            </p:extLst>
+          </p:nvPr>
+        </p:nvSpPr>
+        <p:spPr>
+          <a:xfrm>
+            <a:off x="0" y="0"/>
+            <a:ext cx="6323162" cy="5593660"/>
+          </a:xfrm>
+          <a:custGeom>
+            <a:avLst/>
+            <a:gdLst>
+              <a:gd name="connsiteX0" fmla="*/ 2177447 w 6323162"/>
+              <a:gd name="connsiteY0" fmla="*/ 0 h 5593660"/>
+              <a:gd name="connsiteX1" fmla="*/ 4826316 w 6323162"/>
+              <a:gd name="connsiteY1" fmla="*/ 0 h 5593660"/>
+              <a:gd name="connsiteX2" fmla="*/ 4971508 w 6323162"/>
+              <a:gd name="connsiteY2" fmla="*/ 75777 h 5593660"/>
+              <a:gd name="connsiteX3" fmla="*/ 5577109 w 6323162"/>
+              <a:gd name="connsiteY3" fmla="*/ 586873 h 5593660"/>
+              <a:gd name="connsiteX4" fmla="*/ 6323162 w 6323162"/>
+              <a:gd name="connsiteY4" fmla="*/ 2829148 h 5593660"/>
+              <a:gd name="connsiteX5" fmla="*/ 5990836 w 6323162"/>
+              <a:gd name="connsiteY5" fmla="*/ 3748729 h 5593660"/>
+              <a:gd name="connsiteX6" fmla="*/ 5006899 w 6323162"/>
+              <a:gd name="connsiteY6" fmla="*/ 4604992 h 5593660"/>
+              <a:gd name="connsiteX7" fmla="*/ 4790566 w 6323162"/>
+              <a:gd name="connsiteY7" fmla="*/ 4768788 h 5593660"/>
+              <a:gd name="connsiteX8" fmla="*/ 3012943 w 6323162"/>
+              <a:gd name="connsiteY8" fmla="*/ 5593660 h 5593660"/>
+              <a:gd name="connsiteX9" fmla="*/ 671286 w 6323162"/>
+              <a:gd name="connsiteY9" fmla="*/ 4252856 h 5593660"/>
+              <a:gd name="connsiteX10" fmla="*/ 421733 w 6323162"/>
+              <a:gd name="connsiteY10" fmla="*/ 3909839 h 5593660"/>
+              <a:gd name="connsiteX11" fmla="*/ 48655 w 6323162"/>
+              <a:gd name="connsiteY11" fmla="*/ 3351082 h 5593660"/>
+              <a:gd name="connsiteX12" fmla="*/ 0 w 6323162"/>
+              <a:gd name="connsiteY12" fmla="*/ 3239820 h 5593660"/>
+              <a:gd name="connsiteX13" fmla="*/ 0 w 6323162"/>
+              <a:gd name="connsiteY13" fmla="*/ 2248150 h 5593660"/>
+              <a:gd name="connsiteX14" fmla="*/ 1658 w 6323162"/>
+              <a:gd name="connsiteY14" fmla="*/ 2239520 h 5593660"/>
+              <a:gd name="connsiteX15" fmla="*/ 225714 w 6323162"/>
+              <a:gd name="connsiteY15" fmla="*/ 1665285 h 5593660"/>
+              <a:gd name="connsiteX16" fmla="*/ 1050970 w 6323162"/>
+              <a:gd name="connsiteY16" fmla="*/ 665214 h 5593660"/>
+              <a:gd name="connsiteX17" fmla="*/ 1923692 w 6323162"/>
+              <a:gd name="connsiteY17" fmla="*/ 107844 h 5593660"/>
+            </a:gdLst>
+            <a:ahLst/>
+            <a:cxnLst>
+              <a:cxn ang="0">
+                <a:pos x="connsiteX0" y="connsiteY0"/>
+              </a:cxn>
+              <a:cxn ang="0">
+                <a:pos x="connsiteX1" y="connsiteY1"/>
+              </a:cxn>
+              <a:cxn ang="0">
+                <a:pos x="connsiteX2" y="connsiteY2"/>
+              </a:cxn>
+              <a:cxn ang="0">
+                <a:pos x="connsiteX3" y="connsiteY3"/>
+              </a:cxn>
+              <a:cxn ang="0">
+                <a:pos x="connsiteX4" y="connsiteY4"/>
+              </a:cxn>
+              <a:cxn ang="0">
+                <a:pos x="connsiteX5" y="connsiteY5"/>
+              </a:cxn>
+              <a:cxn ang="0">
+                <a:pos x="connsiteX6" y="connsiteY6"/>
+              </a:cxn>
+              <a:cxn ang="0">
+                <a:pos x="connsiteX7" y="connsiteY7"/>
+              </a:cxn>
+              <a:cxn ang="0">
+                <a:pos x="connsiteX8" y="connsiteY8"/>
+              </a:cxn>
+              <a:cxn ang="0">
+                <a:pos x="connsiteX9" y="connsiteY9"/>
+              </a:cxn>
+              <a:cxn ang="0">
+                <a:pos x="connsiteX10" y="connsiteY10"/>
+              </a:cxn>
+              <a:cxn ang="0">
+                <a:pos x="connsiteX11" y="connsiteY11"/>
+              </a:cxn>
+              <a:cxn ang="0">
+                <a:pos x="connsiteX12" y="connsiteY12"/>
+              </a:cxn>
+              <a:cxn ang="0">
+                <a:pos x="connsiteX13" y="connsiteY13"/>
+              </a:cxn>
+              <a:cxn ang="0">
+                <a:pos x="connsiteX14" y="connsiteY14"/>
+              </a:cxn>
+              <a:cxn ang="0">
+                <a:pos x="connsiteX15" y="connsiteY15"/>
+              </a:cxn>
+              <a:cxn ang="0">
+                <a:pos x="connsiteX16" y="connsiteY16"/>
+              </a:cxn>
+              <a:cxn ang="0">
+                <a:pos x="connsiteX17" y="connsiteY17"/>
+              </a:cxn>
+            </a:cxnLst>
+            <a:rect l="l" t="t" r="r" b="b"/>
+            <a:pathLst>
+              <a:path w="6323162" h="5593660">
+                <a:moveTo>
+                  <a:pt x="2177447" y="0"/>
+                </a:moveTo>
+                <a:lnTo>
+                  <a:pt x="4826316" y="0"/>
+                </a:lnTo>
+                <a:lnTo>
+                  <a:pt x="4971508" y="75777"/>
+                </a:lnTo>
+                <a:cubicBezTo>
+                  <a:pt x="5197582" y="210111"/>
+                  <a:pt x="5400550" y="381325"/>
+                  <a:pt x="5577109" y="586873"/>
+                </a:cubicBezTo>
+                <a:cubicBezTo>
+                  <a:pt x="6058235" y="1147205"/>
+                  <a:pt x="6323162" y="1943505"/>
+                  <a:pt x="6323162" y="2829148"/>
+                </a:cubicBezTo>
+                <a:cubicBezTo>
+                  <a:pt x="6323162" y="3182494"/>
+                  <a:pt x="6220623" y="3466081"/>
+                  <a:pt x="5990836" y="3748729"/>
+                </a:cubicBezTo>
+                <a:cubicBezTo>
+                  <a:pt x="5750480" y="4044392"/>
+                  <a:pt x="5389327" y="4316711"/>
+                  <a:pt x="5006899" y="4604992"/>
+                </a:cubicBezTo>
+                <a:cubicBezTo>
+                  <a:pt x="4936343" y="4658116"/>
+                  <a:pt x="4863453" y="4713117"/>
+                  <a:pt x="4790566" y="4768788"/>
+                </a:cubicBezTo>
+                <a:cubicBezTo>
+                  <a:pt x="4138128" y="5267012"/>
+                  <a:pt x="3661945" y="5593660"/>
+                  <a:pt x="3012943" y="5593660"/>
+                </a:cubicBezTo>
+                <a:cubicBezTo>
+                  <a:pt x="2024062" y="5593660"/>
+                  <a:pt x="1323723" y="5192693"/>
+                  <a:pt x="671286" y="4252856"/>
+                </a:cubicBezTo>
+                <a:cubicBezTo>
+                  <a:pt x="585906" y="4129842"/>
+                  <a:pt x="502446" y="4017964"/>
+                  <a:pt x="421733" y="3909839"/>
+                </a:cubicBezTo>
+                <a:cubicBezTo>
+                  <a:pt x="254471" y="3685679"/>
+                  <a:pt x="130655" y="3515312"/>
+                  <a:pt x="48655" y="3351082"/>
+                </a:cubicBezTo>
+                <a:lnTo>
+                  <a:pt x="0" y="3239820"/>
+                </a:lnTo>
+                <a:lnTo>
+                  <a:pt x="0" y="2248150"/>
+                </a:lnTo>
+                <a:lnTo>
+                  <a:pt x="1658" y="2239520"/>
+                </a:lnTo>
+                <a:cubicBezTo>
+                  <a:pt x="51657" y="2045089"/>
+                  <a:pt x="126469" y="1853225"/>
+                  <a:pt x="225714" y="1665285"/>
+                </a:cubicBezTo>
+                <a:cubicBezTo>
+                  <a:pt x="419948" y="1297585"/>
+                  <a:pt x="697641" y="961011"/>
+                  <a:pt x="1050970" y="665214"/>
+                </a:cubicBezTo>
+                <a:cubicBezTo>
+                  <a:pt x="1311437" y="447090"/>
+                  <a:pt x="1608578" y="257641"/>
+                  <a:pt x="1923692" y="107844"/>
+                </a:cubicBezTo>
+                <a:close/>
+              </a:path>
+            </a:pathLst>
+          </a:custGeom>
+          <a:solidFill>
+            <a:schemeClr val="bg1">
+              <a:alpha val="30000"/>
+            </a:schemeClr>
+          </a:solidFill>
+          <a:ln w="15875">
+            <a:noFill/>
+          </a:ln>
+        </p:spPr>
+        <p:style>
+          <a:lnRef idx="2">
+            <a:schemeClr val="accent1">
+              <a:shade val="50000"/>
+            </a:schemeClr>
+          </a:lnRef>
+          <a:fillRef idx="1">
+            <a:schemeClr val="accent1"/>
+          </a:fillRef>
+          <a:effectRef idx="0">
+            <a:schemeClr val="accent1"/>
+          </a:effectRef>
+          <a:fontRef idx="minor">
+            <a:schemeClr val="lt1"/>
+          </a:fontRef>
+        </p:style>
+        <p:txBody>
+          <a:bodyPr wrap="square" rtlCol="0" anchor="ctr">
+            <a:noAutofit/>
+          </a:bodyPr>
+          <a:lstStyle/>
+          <a:p>
+            <a:pPr algn="ctr"/>
+            <a:endParaRPr lang="en-US" dirty="0"/>
+          </a:p>
+        </p:txBody>
+      </p:sp>
+      <p:sp>
+        <p:nvSpPr>
+          <p:cNvPr id="16" name="Freeform: Shape 15">
+            <a:extLst>
+              <a:ext uri="{FF2B5EF4-FFF2-40B4-BE49-F238E27FC236}">
+                <a16:creationId xmlns:a16="http://schemas.microsoft.com/office/drawing/2014/main" id="{5FB5F3BA-58DF-40DA-AE44-974A00E0619C}"/>
+              </a:ext>
+              <a:ext uri="{C183D7F6-B498-43B3-948B-1728B52AA6E4}">
+                <adec:decorative xmlns:adec="http://schemas.microsoft.com/office/drawing/2017/decorative" val="1"/>
+              </a:ext>
+            </a:extLst>
+          </p:cNvPr>
+          <p:cNvSpPr>
+            <a:spLocks noGrp="1" noRot="1" noChangeAspect="1" noMove="1" noResize="1" noEditPoints="1" noAdjustHandles="1" noChangeArrowheads="1" noChangeShapeType="1" noTextEdit="1"/>
+          </p:cNvSpPr>
+          <p:nvPr>
+            <p:extLst>
+              <p:ext uri="{386F3935-93C4-4BCD-93E2-E3B085C9AB24}">
+                <p16:designElem xmlns:p16="http://schemas.microsoft.com/office/powerpoint/2015/main" val="1"/>
+              </p:ext>
+            </p:extLst>
+          </p:nvPr>
+        </p:nvSpPr>
+        <p:spPr>
+          <a:xfrm>
+            <a:off x="6795930" y="1598213"/>
+            <a:ext cx="5396070" cy="5259788"/>
+          </a:xfrm>
+          <a:custGeom>
+            <a:avLst/>
+            <a:gdLst>
+              <a:gd name="connsiteX0" fmla="*/ 2739575 w 5261264"/>
+              <a:gd name="connsiteY0" fmla="*/ 1369 h 4909930"/>
+              <a:gd name="connsiteX1" fmla="*/ 3931992 w 5261264"/>
+              <a:gd name="connsiteY1" fmla="*/ 357115 h 4909930"/>
+              <a:gd name="connsiteX2" fmla="*/ 5228644 w 5261264"/>
+              <a:gd name="connsiteY2" fmla="*/ 1704869 h 4909930"/>
+              <a:gd name="connsiteX3" fmla="*/ 5261264 w 5261264"/>
+              <a:gd name="connsiteY3" fmla="*/ 1769901 h 4909930"/>
+              <a:gd name="connsiteX4" fmla="*/ 5261264 w 5261264"/>
+              <a:gd name="connsiteY4" fmla="*/ 4640262 h 4909930"/>
+              <a:gd name="connsiteX5" fmla="*/ 5239287 w 5261264"/>
+              <a:gd name="connsiteY5" fmla="*/ 4674079 h 4909930"/>
+              <a:gd name="connsiteX6" fmla="*/ 5039558 w 5261264"/>
+              <a:gd name="connsiteY6" fmla="*/ 4893028 h 4909930"/>
+              <a:gd name="connsiteX7" fmla="*/ 5018342 w 5261264"/>
+              <a:gd name="connsiteY7" fmla="*/ 4909930 h 4909930"/>
+              <a:gd name="connsiteX8" fmla="*/ 962510 w 5261264"/>
+              <a:gd name="connsiteY8" fmla="*/ 4909930 h 4909930"/>
+              <a:gd name="connsiteX9" fmla="*/ 821338 w 5261264"/>
+              <a:gd name="connsiteY9" fmla="*/ 4707517 h 4909930"/>
+              <a:gd name="connsiteX10" fmla="*/ 448558 w 5261264"/>
+              <a:gd name="connsiteY10" fmla="*/ 3922606 h 4909930"/>
+              <a:gd name="connsiteX11" fmla="*/ 221727 w 5261264"/>
+              <a:gd name="connsiteY11" fmla="*/ 1588926 h 4909930"/>
+              <a:gd name="connsiteX12" fmla="*/ 2739575 w 5261264"/>
+              <a:gd name="connsiteY12" fmla="*/ 1369 h 4909930"/>
+            </a:gdLst>
+            <a:ahLst/>
+            <a:cxnLst>
+              <a:cxn ang="0">
+                <a:pos x="connsiteX0" y="connsiteY0"/>
+              </a:cxn>
+              <a:cxn ang="0">
+                <a:pos x="connsiteX1" y="connsiteY1"/>
+              </a:cxn>
+              <a:cxn ang="0">
+                <a:pos x="connsiteX2" y="connsiteY2"/>
+              </a:cxn>
+              <a:cxn ang="0">
+                <a:pos x="connsiteX3" y="connsiteY3"/>
+              </a:cxn>
+              <a:cxn ang="0">
+                <a:pos x="connsiteX4" y="connsiteY4"/>
+              </a:cxn>
+              <a:cxn ang="0">
+                <a:pos x="connsiteX5" y="connsiteY5"/>
+              </a:cxn>
+              <a:cxn ang="0">
+                <a:pos x="connsiteX6" y="connsiteY6"/>
+              </a:cxn>
+              <a:cxn ang="0">
+                <a:pos x="connsiteX7" y="connsiteY7"/>
+              </a:cxn>
+              <a:cxn ang="0">
+                <a:pos x="connsiteX8" y="connsiteY8"/>
+              </a:cxn>
+              <a:cxn ang="0">
+                <a:pos x="connsiteX9" y="connsiteY9"/>
+              </a:cxn>
+              <a:cxn ang="0">
+                <a:pos x="connsiteX10" y="connsiteY10"/>
+              </a:cxn>
+              <a:cxn ang="0">
+                <a:pos x="connsiteX11" y="connsiteY11"/>
+              </a:cxn>
+              <a:cxn ang="0">
+                <a:pos x="connsiteX12" y="connsiteY12"/>
+              </a:cxn>
+            </a:cxnLst>
+            <a:rect l="l" t="t" r="r" b="b"/>
+            <a:pathLst>
+              <a:path w="5261264" h="4909930">
+                <a:moveTo>
+                  <a:pt x="2739575" y="1369"/>
+                </a:moveTo>
+                <a:cubicBezTo>
+                  <a:pt x="3132207" y="14841"/>
+                  <a:pt x="3535383" y="128133"/>
+                  <a:pt x="3931992" y="357115"/>
+                </a:cubicBezTo>
+                <a:cubicBezTo>
+                  <a:pt x="4474996" y="670619"/>
+                  <a:pt x="4925124" y="1151857"/>
+                  <a:pt x="5228644" y="1704869"/>
+                </a:cubicBezTo>
+                <a:lnTo>
+                  <a:pt x="5261264" y="1769901"/>
+                </a:lnTo>
+                <a:lnTo>
+                  <a:pt x="5261264" y="4640262"/>
+                </a:lnTo>
+                <a:lnTo>
+                  <a:pt x="5239287" y="4674079"/>
+                </a:lnTo>
+                <a:cubicBezTo>
+                  <a:pt x="5177453" y="4758643"/>
+                  <a:pt x="5110673" y="4830413"/>
+                  <a:pt x="5039558" y="4893028"/>
+                </a:cubicBezTo>
+                <a:lnTo>
+                  <a:pt x="5018342" y="4909930"/>
+                </a:lnTo>
+                <a:lnTo>
+                  <a:pt x="962510" y="4909930"/>
+                </a:lnTo>
+                <a:lnTo>
+                  <a:pt x="821338" y="4707517"/>
+                </a:lnTo>
+                <a:cubicBezTo>
+                  <a:pt x="672683" y="4465717"/>
+                  <a:pt x="560617" y="4198197"/>
+                  <a:pt x="448558" y="3922606"/>
+                </a:cubicBezTo>
+                <a:cubicBezTo>
+                  <a:pt x="120358" y="3115488"/>
+                  <a:pt x="-245146" y="2397572"/>
+                  <a:pt x="221727" y="1588926"/>
+                </a:cubicBezTo>
+                <a:cubicBezTo>
+                  <a:pt x="801679" y="584418"/>
+                  <a:pt x="1736188" y="-33060"/>
+                  <a:pt x="2739575" y="1369"/>
+                </a:cubicBezTo>
+                <a:close/>
+              </a:path>
+            </a:pathLst>
+          </a:custGeom>
+          <a:solidFill>
+            <a:schemeClr val="bg1">
+              <a:alpha val="30000"/>
+            </a:schemeClr>
+          </a:solidFill>
+          <a:ln>
+            <a:noFill/>
+          </a:ln>
+        </p:spPr>
+        <p:style>
+          <a:lnRef idx="2">
+            <a:schemeClr val="accent1">
+              <a:shade val="50000"/>
+            </a:schemeClr>
+          </a:lnRef>
+          <a:fillRef idx="1">
+            <a:schemeClr val="accent1"/>
+          </a:fillRef>
+          <a:effectRef idx="0">
+            <a:schemeClr val="accent1"/>
+          </a:effectRef>
+          <a:fontRef idx="minor">
+            <a:schemeClr val="lt1"/>
+          </a:fontRef>
+        </p:style>
+        <p:txBody>
+          <a:bodyPr wrap="square" rtlCol="0" anchor="ctr">
+            <a:noAutofit/>
+          </a:bodyPr>
+          <a:lstStyle/>
+          <a:p>
+            <a:pPr marL="0" marR="0" lvl="0" indent="0" algn="ctr" defTabSz="457200" rtl="0" eaLnBrk="1" fontAlgn="auto" latinLnBrk="0" hangingPunct="1">
+              <a:lnSpc>
+                <a:spcPct val="100000"/>
+              </a:lnSpc>
+              <a:spcBef>
+                <a:spcPts val="0"/>
+              </a:spcBef>
+              <a:spcAft>
+                <a:spcPts val="0"/>
+              </a:spcAft>
+              <a:buClrTx/>
+              <a:buSzTx/>
+              <a:buFontTx/>
+              <a:buNone/>
+              <a:tabLst/>
+              <a:defRPr/>
+            </a:pPr>
+            <a:endParaRPr kumimoji="0" lang="en-US" sz="1800" b="0" i="0" u="none" strike="noStrike" kern="1200" cap="none" spc="0" normalizeH="0" baseline="0" noProof="0">
+              <a:ln>
+                <a:noFill/>
+              </a:ln>
+              <a:solidFill>
+                <a:prstClr val="white"/>
+              </a:solidFill>
+              <a:effectLst/>
+              <a:uLnTx/>
+              <a:uFillTx/>
+              <a:latin typeface="Meiryo"/>
+              <a:ea typeface="+mn-ea"/>
+              <a:cs typeface="+mn-cs"/>
+            </a:endParaRPr>
+          </a:p>
+        </p:txBody>
+      </p:sp>
+      <p:sp>
+        <p:nvSpPr>
+          <p:cNvPr id="18" name="Freeform: Shape 17">
+            <a:extLst>
+              <a:ext uri="{FF2B5EF4-FFF2-40B4-BE49-F238E27FC236}">
+                <a16:creationId xmlns:a16="http://schemas.microsoft.com/office/drawing/2014/main" id="{DE1994AC-22D1-4B48-9EDA-BE373E704567}"/>
+              </a:ext>
+              <a:ext uri="{C183D7F6-B498-43B3-948B-1728B52AA6E4}">
+                <adec:decorative xmlns:adec="http://schemas.microsoft.com/office/drawing/2017/decorative" val="1"/>
+              </a:ext>
+            </a:extLst>
+          </p:cNvPr>
+          <p:cNvSpPr>
+            <a:spLocks noGrp="1" noRot="1" noChangeAspect="1" noMove="1" noResize="1" noEditPoints="1" noAdjustHandles="1" noChangeArrowheads="1" noChangeShapeType="1" noTextEdit="1"/>
+          </p:cNvSpPr>
+          <p:nvPr>
+            <p:extLst>
+              <p:ext uri="{386F3935-93C4-4BCD-93E2-E3B085C9AB24}">
+                <p16:designElem xmlns:p16="http://schemas.microsoft.com/office/powerpoint/2015/main" val="1"/>
+              </p:ext>
+            </p:extLst>
+          </p:nvPr>
+        </p:nvSpPr>
+        <p:spPr>
+          <a:xfrm>
+            <a:off x="6541758" y="1407380"/>
+            <a:ext cx="5665992" cy="5466522"/>
+          </a:xfrm>
+          <a:custGeom>
+            <a:avLst/>
+            <a:gdLst>
+              <a:gd name="connsiteX0" fmla="*/ 3113576 w 5665992"/>
+              <a:gd name="connsiteY0" fmla="*/ 1556 h 5401530"/>
+              <a:gd name="connsiteX1" fmla="*/ 4468777 w 5665992"/>
+              <a:gd name="connsiteY1" fmla="*/ 405866 h 5401530"/>
+              <a:gd name="connsiteX2" fmla="*/ 5525792 w 5665992"/>
+              <a:gd name="connsiteY2" fmla="*/ 1317461 h 5401530"/>
+              <a:gd name="connsiteX3" fmla="*/ 5665992 w 5665992"/>
+              <a:gd name="connsiteY3" fmla="*/ 1506159 h 5401530"/>
+              <a:gd name="connsiteX4" fmla="*/ 5665992 w 5665992"/>
+              <a:gd name="connsiteY4" fmla="*/ 5401530 h 5401530"/>
+              <a:gd name="connsiteX5" fmla="*/ 965932 w 5665992"/>
+              <a:gd name="connsiteY5" fmla="*/ 5401530 h 5401530"/>
+              <a:gd name="connsiteX6" fmla="*/ 836753 w 5665992"/>
+              <a:gd name="connsiteY6" fmla="*/ 5181943 h 5401530"/>
+              <a:gd name="connsiteX7" fmla="*/ 509793 w 5665992"/>
+              <a:gd name="connsiteY7" fmla="*/ 4458111 h 5401530"/>
+              <a:gd name="connsiteX8" fmla="*/ 251995 w 5665992"/>
+              <a:gd name="connsiteY8" fmla="*/ 1805844 h 5401530"/>
+              <a:gd name="connsiteX9" fmla="*/ 3113576 w 5665992"/>
+              <a:gd name="connsiteY9" fmla="*/ 1556 h 5401530"/>
+            </a:gdLst>
+            <a:ahLst/>
+            <a:cxnLst>
+              <a:cxn ang="0">
+                <a:pos x="connsiteX0" y="connsiteY0"/>
+              </a:cxn>
+              <a:cxn ang="0">
+                <a:pos x="connsiteX1" y="connsiteY1"/>
+              </a:cxn>
+              <a:cxn ang="0">
+                <a:pos x="connsiteX2" y="connsiteY2"/>
+              </a:cxn>
+              <a:cxn ang="0">
+                <a:pos x="connsiteX3" y="connsiteY3"/>
+              </a:cxn>
+              <a:cxn ang="0">
+                <a:pos x="connsiteX4" y="connsiteY4"/>
+              </a:cxn>
+              <a:cxn ang="0">
+                <a:pos x="connsiteX5" y="connsiteY5"/>
+              </a:cxn>
+              <a:cxn ang="0">
+                <a:pos x="connsiteX6" y="connsiteY6"/>
+              </a:cxn>
+              <a:cxn ang="0">
+                <a:pos x="connsiteX7" y="connsiteY7"/>
+              </a:cxn>
+              <a:cxn ang="0">
+                <a:pos x="connsiteX8" y="connsiteY8"/>
+              </a:cxn>
+              <a:cxn ang="0">
+                <a:pos x="connsiteX9" y="connsiteY9"/>
+              </a:cxn>
+            </a:cxnLst>
+            <a:rect l="l" t="t" r="r" b="b"/>
+            <a:pathLst>
+              <a:path w="5665992" h="5401530">
+                <a:moveTo>
+                  <a:pt x="3113576" y="1556"/>
+                </a:moveTo>
+                <a:cubicBezTo>
+                  <a:pt x="3559807" y="16866"/>
+                  <a:pt x="4018025" y="145625"/>
+                  <a:pt x="4468777" y="405866"/>
+                </a:cubicBezTo>
+                <a:cubicBezTo>
+                  <a:pt x="4871803" y="638554"/>
+                  <a:pt x="5229811" y="952545"/>
+                  <a:pt x="5525792" y="1317461"/>
+                </a:cubicBezTo>
+                <a:lnTo>
+                  <a:pt x="5665992" y="1506159"/>
+                </a:lnTo>
+                <a:lnTo>
+                  <a:pt x="5665992" y="5401530"/>
+                </a:lnTo>
+                <a:lnTo>
+                  <a:pt x="965932" y="5401530"/>
+                </a:lnTo>
+                <a:lnTo>
+                  <a:pt x="836753" y="5181943"/>
+                </a:lnTo>
+                <a:cubicBezTo>
+                  <a:pt x="713569" y="4953383"/>
+                  <a:pt x="611679" y="4708683"/>
+                  <a:pt x="509793" y="4458111"/>
+                </a:cubicBezTo>
+                <a:cubicBezTo>
+                  <a:pt x="136790" y="3540808"/>
+                  <a:pt x="-278612" y="2724882"/>
+                  <a:pt x="251995" y="1805844"/>
+                </a:cubicBezTo>
+                <a:cubicBezTo>
+                  <a:pt x="911122" y="664202"/>
+                  <a:pt x="1973207" y="-37572"/>
+                  <a:pt x="3113576" y="1556"/>
+                </a:cubicBezTo>
+                <a:close/>
+              </a:path>
+            </a:pathLst>
+          </a:custGeom>
+          <a:noFill/>
+          <a:ln w="19050">
+            <a:solidFill>
+              <a:srgbClr val="FFFFFF">
+                <a:alpha val="50000"/>
+              </a:srgbClr>
+            </a:solidFill>
+          </a:ln>
+        </p:spPr>
+        <p:style>
+          <a:lnRef idx="2">
+            <a:schemeClr val="accent1">
+              <a:shade val="50000"/>
+            </a:schemeClr>
+          </a:lnRef>
+          <a:fillRef idx="1">
+            <a:schemeClr val="accent1"/>
+          </a:fillRef>
+          <a:effectRef idx="0">
+            <a:schemeClr val="accent1"/>
+          </a:effectRef>
+          <a:fontRef idx="minor">
+            <a:schemeClr val="lt1"/>
+          </a:fontRef>
+        </p:style>
+        <p:txBody>
+          <a:bodyPr wrap="square" rtlCol="0" anchor="ctr">
+            <a:noAutofit/>
+          </a:bodyPr>
+          <a:lstStyle/>
+          <a:p>
+            <a:pPr marL="0" marR="0" lvl="0" indent="0" algn="ctr" defTabSz="457200" rtl="0" eaLnBrk="1" fontAlgn="auto" latinLnBrk="0" hangingPunct="1">
+              <a:lnSpc>
+                <a:spcPct val="100000"/>
+              </a:lnSpc>
+              <a:spcBef>
+                <a:spcPts val="0"/>
+              </a:spcBef>
+              <a:spcAft>
+                <a:spcPts val="0"/>
+              </a:spcAft>
+              <a:buClrTx/>
+              <a:buSzTx/>
+              <a:buFontTx/>
+              <a:buNone/>
+              <a:tabLst/>
+              <a:defRPr/>
+            </a:pPr>
+            <a:endParaRPr kumimoji="0" lang="en-US" sz="1800" b="0" i="0" u="none" strike="noStrike" kern="1200" cap="none" spc="0" normalizeH="0" baseline="0" noProof="0">
+              <a:ln>
+                <a:noFill/>
+              </a:ln>
+              <a:solidFill>
+                <a:prstClr val="white"/>
+              </a:solidFill>
+              <a:effectLst/>
+              <a:uLnTx/>
+              <a:uFillTx/>
+              <a:latin typeface="Meiryo"/>
+              <a:ea typeface="+mn-ea"/>
+              <a:cs typeface="+mn-cs"/>
+            </a:endParaRPr>
+          </a:p>
+        </p:txBody>
+      </p:sp>
+      <p:sp>
+        <p:nvSpPr>
+          <p:cNvPr id="20" name="Freeform: Shape 19">
+            <a:extLst>
+              <a:ext uri="{FF2B5EF4-FFF2-40B4-BE49-F238E27FC236}">
+                <a16:creationId xmlns:a16="http://schemas.microsoft.com/office/drawing/2014/main" id="{86806086-A782-4311-A63B-1A68574D8067}"/>
+              </a:ext>
+              <a:ext uri="{C183D7F6-B498-43B3-948B-1728B52AA6E4}">
+                <adec:decorative xmlns:adec="http://schemas.microsoft.com/office/drawing/2017/decorative" val="1"/>
+              </a:ext>
+            </a:extLst>
+          </p:cNvPr>
+          <p:cNvSpPr>
+            <a:spLocks noGrp="1" noRot="1" noChangeAspect="1" noMove="1" noResize="1" noEditPoints="1" noAdjustHandles="1" noChangeArrowheads="1" noChangeShapeType="1" noTextEdit="1"/>
+          </p:cNvSpPr>
+          <p:nvPr>
+            <p:extLst>
+              <p:ext uri="{386F3935-93C4-4BCD-93E2-E3B085C9AB24}">
+                <p16:designElem xmlns:p16="http://schemas.microsoft.com/office/powerpoint/2015/main" val="1"/>
+              </p:ext>
+            </p:extLst>
+          </p:nvPr>
+        </p:nvSpPr>
+        <p:spPr>
+          <a:xfrm>
+            <a:off x="-15902" y="-15901"/>
+            <a:ext cx="6578337" cy="5814891"/>
+          </a:xfrm>
+          <a:custGeom>
+            <a:avLst/>
+            <a:gdLst>
+              <a:gd name="connsiteX0" fmla="*/ 1667657 w 6578337"/>
+              <a:gd name="connsiteY0" fmla="*/ 0 h 5814891"/>
+              <a:gd name="connsiteX1" fmla="*/ 5296215 w 6578337"/>
+              <a:gd name="connsiteY1" fmla="*/ 0 h 5814891"/>
+              <a:gd name="connsiteX2" fmla="*/ 5354505 w 6578337"/>
+              <a:gd name="connsiteY2" fmla="*/ 38974 h 5814891"/>
+              <a:gd name="connsiteX3" fmla="*/ 5772761 w 6578337"/>
+              <a:gd name="connsiteY3" fmla="*/ 430996 h 5814891"/>
+              <a:gd name="connsiteX4" fmla="*/ 6578337 w 6578337"/>
+              <a:gd name="connsiteY4" fmla="*/ 2842158 h 5814891"/>
+              <a:gd name="connsiteX5" fmla="*/ 6219497 w 6578337"/>
+              <a:gd name="connsiteY5" fmla="*/ 3831001 h 5814891"/>
+              <a:gd name="connsiteX6" fmla="*/ 5157059 w 6578337"/>
+              <a:gd name="connsiteY6" fmla="*/ 4751758 h 5814891"/>
+              <a:gd name="connsiteX7" fmla="*/ 4923464 w 6578337"/>
+              <a:gd name="connsiteY7" fmla="*/ 4927890 h 5814891"/>
+              <a:gd name="connsiteX8" fmla="*/ 3004017 w 6578337"/>
+              <a:gd name="connsiteY8" fmla="*/ 5814891 h 5814891"/>
+              <a:gd name="connsiteX9" fmla="*/ 475534 w 6578337"/>
+              <a:gd name="connsiteY9" fmla="*/ 4373098 h 5814891"/>
+              <a:gd name="connsiteX10" fmla="*/ 206071 w 6578337"/>
+              <a:gd name="connsiteY10" fmla="*/ 4004246 h 5814891"/>
+              <a:gd name="connsiteX11" fmla="*/ 79385 w 6578337"/>
+              <a:gd name="connsiteY11" fmla="*/ 3833508 h 5814891"/>
+              <a:gd name="connsiteX12" fmla="*/ 0 w 6578337"/>
+              <a:gd name="connsiteY12" fmla="*/ 3721725 h 5814891"/>
+              <a:gd name="connsiteX13" fmla="*/ 0 w 6578337"/>
+              <a:gd name="connsiteY13" fmla="*/ 1581323 h 5814891"/>
+              <a:gd name="connsiteX14" fmla="*/ 168477 w 6578337"/>
+              <a:gd name="connsiteY14" fmla="*/ 1300525 h 5814891"/>
+              <a:gd name="connsiteX15" fmla="*/ 885512 w 6578337"/>
+              <a:gd name="connsiteY15" fmla="*/ 515238 h 5814891"/>
+              <a:gd name="connsiteX16" fmla="*/ 1494824 w 6578337"/>
+              <a:gd name="connsiteY16" fmla="*/ 90742 h 5814891"/>
+            </a:gdLst>
+            <a:ahLst/>
+            <a:cxnLst>
+              <a:cxn ang="0">
+                <a:pos x="connsiteX0" y="connsiteY0"/>
+              </a:cxn>
+              <a:cxn ang="0">
+                <a:pos x="connsiteX1" y="connsiteY1"/>
+              </a:cxn>
+              <a:cxn ang="0">
+                <a:pos x="connsiteX2" y="connsiteY2"/>
+              </a:cxn>
+              <a:cxn ang="0">
+                <a:pos x="connsiteX3" y="connsiteY3"/>
+              </a:cxn>
+              <a:cxn ang="0">
+                <a:pos x="connsiteX4" y="connsiteY4"/>
+              </a:cxn>
+              <a:cxn ang="0">
+                <a:pos x="connsiteX5" y="connsiteY5"/>
+              </a:cxn>
+              <a:cxn ang="0">
+                <a:pos x="connsiteX6" y="connsiteY6"/>
+              </a:cxn>
+              <a:cxn ang="0">
+                <a:pos x="connsiteX7" y="connsiteY7"/>
+              </a:cxn>
+              <a:cxn ang="0">
+                <a:pos x="connsiteX8" y="connsiteY8"/>
+              </a:cxn>
+              <a:cxn ang="0">
+                <a:pos x="connsiteX9" y="connsiteY9"/>
+              </a:cxn>
+              <a:cxn ang="0">
+                <a:pos x="connsiteX10" y="connsiteY10"/>
+              </a:cxn>
+              <a:cxn ang="0">
+                <a:pos x="connsiteX11" y="connsiteY11"/>
+              </a:cxn>
+              <a:cxn ang="0">
+                <a:pos x="connsiteX12" y="connsiteY12"/>
+              </a:cxn>
+              <a:cxn ang="0">
+                <a:pos x="connsiteX13" y="connsiteY13"/>
+              </a:cxn>
+              <a:cxn ang="0">
+                <a:pos x="connsiteX14" y="connsiteY14"/>
+              </a:cxn>
+              <a:cxn ang="0">
+                <a:pos x="connsiteX15" y="connsiteY15"/>
+              </a:cxn>
+              <a:cxn ang="0">
+                <a:pos x="connsiteX16" y="connsiteY16"/>
+              </a:cxn>
+            </a:cxnLst>
+            <a:rect l="l" t="t" r="r" b="b"/>
+            <a:pathLst>
+              <a:path w="6578337" h="5814891">
+                <a:moveTo>
+                  <a:pt x="1667657" y="0"/>
+                </a:moveTo>
+                <a:lnTo>
+                  <a:pt x="5296215" y="0"/>
+                </a:lnTo>
+                <a:lnTo>
+                  <a:pt x="5354505" y="38974"/>
+                </a:lnTo>
+                <a:cubicBezTo>
+                  <a:pt x="5505893" y="152699"/>
+                  <a:pt x="5645664" y="283643"/>
+                  <a:pt x="5772761" y="430996"/>
+                </a:cubicBezTo>
+                <a:cubicBezTo>
+                  <a:pt x="6292274" y="1033532"/>
+                  <a:pt x="6578337" y="1889809"/>
+                  <a:pt x="6578337" y="2842158"/>
+                </a:cubicBezTo>
+                <a:cubicBezTo>
+                  <a:pt x="6578337" y="3222117"/>
+                  <a:pt x="6467617" y="3527065"/>
+                  <a:pt x="6219497" y="3831001"/>
+                </a:cubicBezTo>
+                <a:cubicBezTo>
+                  <a:pt x="5959965" y="4148933"/>
+                  <a:pt x="5569997" y="4441763"/>
+                  <a:pt x="5157059" y="4751758"/>
+                </a:cubicBezTo>
+                <a:cubicBezTo>
+                  <a:pt x="5080873" y="4808882"/>
+                  <a:pt x="5002168" y="4868026"/>
+                  <a:pt x="4923464" y="4927890"/>
+                </a:cubicBezTo>
+                <a:cubicBezTo>
+                  <a:pt x="4218974" y="5463640"/>
+                  <a:pt x="3704799" y="5814891"/>
+                  <a:pt x="3004017" y="5814891"/>
+                </a:cubicBezTo>
+                <a:cubicBezTo>
+                  <a:pt x="1936240" y="5814891"/>
+                  <a:pt x="1180025" y="5383723"/>
+                  <a:pt x="475534" y="4373098"/>
+                </a:cubicBezTo>
+                <a:cubicBezTo>
+                  <a:pt x="383343" y="4240819"/>
+                  <a:pt x="293225" y="4120515"/>
+                  <a:pt x="206071" y="4004246"/>
+                </a:cubicBezTo>
+                <a:cubicBezTo>
+                  <a:pt x="160920" y="3943985"/>
+                  <a:pt x="118700" y="3887339"/>
+                  <a:pt x="79385" y="3833508"/>
+                </a:cubicBezTo>
+                <a:lnTo>
+                  <a:pt x="0" y="3721725"/>
+                </a:lnTo>
+                <a:lnTo>
+                  <a:pt x="0" y="1581323"/>
+                </a:lnTo>
+                <a:lnTo>
+                  <a:pt x="168477" y="1300525"/>
+                </a:lnTo>
+                <a:cubicBezTo>
+                  <a:pt x="359173" y="1017017"/>
+                  <a:pt x="599372" y="753795"/>
+                  <a:pt x="885512" y="515238"/>
+                </a:cubicBezTo>
+                <a:cubicBezTo>
+                  <a:pt x="1073010" y="358870"/>
+                  <a:pt x="1278109" y="216205"/>
+                  <a:pt x="1494824" y="90742"/>
+                </a:cubicBezTo>
+                <a:close/>
+              </a:path>
+            </a:pathLst>
+          </a:custGeom>
+          <a:noFill/>
+          <a:ln w="19050">
+            <a:solidFill>
+              <a:srgbClr val="FFFFFF">
+                <a:alpha val="50000"/>
+              </a:srgbClr>
+            </a:solidFill>
+          </a:ln>
+        </p:spPr>
+        <p:style>
+          <a:lnRef idx="2">
+            <a:schemeClr val="accent1">
+              <a:shade val="50000"/>
+            </a:schemeClr>
+          </a:lnRef>
+          <a:fillRef idx="1">
+            <a:schemeClr val="accent1"/>
+          </a:fillRef>
+          <a:effectRef idx="0">
+            <a:schemeClr val="accent1"/>
+          </a:effectRef>
+          <a:fontRef idx="minor">
+            <a:schemeClr val="lt1"/>
+          </a:fontRef>
+        </p:style>
+        <p:txBody>
+          <a:bodyPr wrap="square" rtlCol="0" anchor="ctr">
+            <a:noAutofit/>
+          </a:bodyPr>
+          <a:lstStyle/>
+          <a:p>
+            <a:pPr algn="ctr"/>
+            <a:endParaRPr lang="en-US" dirty="0"/>
+          </a:p>
+        </p:txBody>
+      </p:sp>
+      <p:pic>
+        <p:nvPicPr>
+          <p:cNvPr id="5" name="圖片 4" descr="一張含有 文字, 螢幕擷取畫面, 行動電話, 卡通 的圖片&#10;&#10;自動產生的描述">
+            <a:extLst>
+              <a:ext uri="{FF2B5EF4-FFF2-40B4-BE49-F238E27FC236}">
+                <a16:creationId xmlns:a16="http://schemas.microsoft.com/office/drawing/2014/main" id="{13B24B43-F151-D98E-C9BB-4EFD2F94C4E0}"/>
+              </a:ext>
+            </a:extLst>
+          </p:cNvPr>
+          <p:cNvPicPr>
+            <a:picLocks noChangeAspect="1"/>
+          </p:cNvPicPr>
+          <p:nvPr/>
+        </p:nvPicPr>
+        <p:blipFill>
+          <a:blip r:embed="rId2"/>
+          <a:stretch>
+            <a:fillRect/>
+          </a:stretch>
+        </p:blipFill>
+        <p:spPr>
+          <a:xfrm>
+            <a:off x="2225165" y="339072"/>
+            <a:ext cx="2484000" cy="5018181"/>
+          </a:xfrm>
+          <a:prstGeom prst="rect">
+            <a:avLst/>
+          </a:prstGeom>
+        </p:spPr>
+      </p:pic>
+      <p:pic>
+        <p:nvPicPr>
+          <p:cNvPr id="7" name="圖片 6" descr="一張含有 文字, 行動電話, 螢幕擷取畫面, 行動裝置 的圖片&#10;&#10;自動產生的描述">
+            <a:extLst>
+              <a:ext uri="{FF2B5EF4-FFF2-40B4-BE49-F238E27FC236}">
+                <a16:creationId xmlns:a16="http://schemas.microsoft.com/office/drawing/2014/main" id="{F597A6D9-FDE1-D512-8CF1-C7635720BC40}"/>
+              </a:ext>
+            </a:extLst>
+          </p:cNvPr>
+          <p:cNvPicPr>
+            <a:picLocks noChangeAspect="1"/>
+          </p:cNvPicPr>
+          <p:nvPr/>
+        </p:nvPicPr>
+        <p:blipFill>
+          <a:blip r:embed="rId3"/>
+          <a:stretch>
+            <a:fillRect/>
+          </a:stretch>
+        </p:blipFill>
+        <p:spPr>
+          <a:xfrm>
+            <a:off x="8015792" y="1496036"/>
+            <a:ext cx="2484000" cy="5018183"/>
+          </a:xfrm>
+          <a:prstGeom prst="rect">
+            <a:avLst/>
+          </a:prstGeom>
+        </p:spPr>
+      </p:pic>
+      <p:grpSp>
+        <p:nvGrpSpPr>
+          <p:cNvPr id="22" name="群組 21">
+            <a:extLst>
+              <a:ext uri="{FF2B5EF4-FFF2-40B4-BE49-F238E27FC236}">
+                <a16:creationId xmlns:a16="http://schemas.microsoft.com/office/drawing/2014/main" id="{143AA094-483A-D3CE-DE25-963CA188F15F}"/>
+              </a:ext>
+            </a:extLst>
+          </p:cNvPr>
+          <p:cNvGrpSpPr/>
+          <p:nvPr/>
+        </p:nvGrpSpPr>
+        <p:grpSpPr>
+          <a:xfrm>
+            <a:off x="5088401" y="3547928"/>
+            <a:ext cx="2501326" cy="2045732"/>
+            <a:chOff x="4980688" y="3974653"/>
+            <a:chExt cx="2501326" cy="2045732"/>
+          </a:xfrm>
+        </p:grpSpPr>
+        <p:grpSp>
+          <p:nvGrpSpPr>
+            <p:cNvPr id="19" name="群組 18">
+              <a:extLst>
+                <a:ext uri="{FF2B5EF4-FFF2-40B4-BE49-F238E27FC236}">
+                  <a16:creationId xmlns:a16="http://schemas.microsoft.com/office/drawing/2014/main" id="{F22D1256-3607-062F-C861-D9A1EB37F67F}"/>
+                </a:ext>
+              </a:extLst>
+            </p:cNvPr>
+            <p:cNvGrpSpPr/>
+            <p:nvPr/>
+          </p:nvGrpSpPr>
+          <p:grpSpPr>
+            <a:xfrm>
+              <a:off x="5469351" y="3974653"/>
+              <a:ext cx="1524000" cy="1676400"/>
+              <a:chOff x="5140207" y="1138944"/>
+              <a:chExt cx="1524000" cy="1676400"/>
+            </a:xfrm>
+            <a:solidFill>
+              <a:srgbClr val="A16B40"/>
+            </a:solidFill>
+          </p:grpSpPr>
+          <p:sp>
+            <p:nvSpPr>
+              <p:cNvPr id="15" name="手繪多邊形 14">
+                <a:extLst>
+                  <a:ext uri="{FF2B5EF4-FFF2-40B4-BE49-F238E27FC236}">
+                    <a16:creationId xmlns:a16="http://schemas.microsoft.com/office/drawing/2014/main" id="{3648ECDB-C739-8AAD-0D84-D096BC205FE2}"/>
+                  </a:ext>
+                </a:extLst>
+              </p:cNvPr>
+              <p:cNvSpPr/>
+              <p:nvPr/>
+            </p:nvSpPr>
+            <p:spPr>
+              <a:xfrm>
+                <a:off x="5368807" y="1443744"/>
+                <a:ext cx="1142967" cy="1371600"/>
+              </a:xfrm>
+              <a:custGeom>
+                <a:avLst/>
+                <a:gdLst>
+                  <a:gd name="connsiteX0" fmla="*/ 1058418 w 1142967"/>
+                  <a:gd name="connsiteY0" fmla="*/ 742950 h 1371600"/>
+                  <a:gd name="connsiteX1" fmla="*/ 746760 w 1142967"/>
+                  <a:gd name="connsiteY1" fmla="*/ 587502 h 1371600"/>
+                  <a:gd name="connsiteX2" fmla="*/ 678942 w 1142967"/>
+                  <a:gd name="connsiteY2" fmla="*/ 571500 h 1371600"/>
+                  <a:gd name="connsiteX3" fmla="*/ 609600 w 1142967"/>
+                  <a:gd name="connsiteY3" fmla="*/ 571500 h 1371600"/>
+                  <a:gd name="connsiteX4" fmla="*/ 609600 w 1142967"/>
+                  <a:gd name="connsiteY4" fmla="*/ 114300 h 1371600"/>
+                  <a:gd name="connsiteX5" fmla="*/ 495300 w 1142967"/>
+                  <a:gd name="connsiteY5" fmla="*/ 0 h 1371600"/>
+                  <a:gd name="connsiteX6" fmla="*/ 381000 w 1142967"/>
+                  <a:gd name="connsiteY6" fmla="*/ 114300 h 1371600"/>
+                  <a:gd name="connsiteX7" fmla="*/ 381000 w 1142967"/>
+                  <a:gd name="connsiteY7" fmla="*/ 932688 h 1371600"/>
+                  <a:gd name="connsiteX8" fmla="*/ 133350 w 1142967"/>
+                  <a:gd name="connsiteY8" fmla="*/ 876300 h 1371600"/>
+                  <a:gd name="connsiteX9" fmla="*/ 63246 w 1142967"/>
+                  <a:gd name="connsiteY9" fmla="*/ 897636 h 1371600"/>
+                  <a:gd name="connsiteX10" fmla="*/ 0 w 1142967"/>
+                  <a:gd name="connsiteY10" fmla="*/ 961644 h 1371600"/>
+                  <a:gd name="connsiteX11" fmla="*/ 345948 w 1142967"/>
+                  <a:gd name="connsiteY11" fmla="*/ 1326642 h 1371600"/>
+                  <a:gd name="connsiteX12" fmla="*/ 473202 w 1142967"/>
+                  <a:gd name="connsiteY12" fmla="*/ 1371600 h 1371600"/>
+                  <a:gd name="connsiteX13" fmla="*/ 942594 w 1142967"/>
+                  <a:gd name="connsiteY13" fmla="*/ 1371600 h 1371600"/>
+                  <a:gd name="connsiteX14" fmla="*/ 1093470 w 1142967"/>
+                  <a:gd name="connsiteY14" fmla="*/ 1240536 h 1371600"/>
+                  <a:gd name="connsiteX15" fmla="*/ 1141476 w 1142967"/>
+                  <a:gd name="connsiteY15" fmla="*/ 900684 h 1371600"/>
+                  <a:gd name="connsiteX16" fmla="*/ 1058418 w 1142967"/>
+                  <a:gd name="connsiteY16" fmla="*/ 742950 h 1371600"/>
+                </a:gdLst>
+                <a:ahLst/>
+                <a:cxnLst>
+                  <a:cxn ang="0">
+                    <a:pos x="connsiteX0" y="connsiteY0"/>
+                  </a:cxn>
+                  <a:cxn ang="0">
+                    <a:pos x="connsiteX1" y="connsiteY1"/>
+                  </a:cxn>
+                  <a:cxn ang="0">
+                    <a:pos x="connsiteX2" y="connsiteY2"/>
+                  </a:cxn>
+                  <a:cxn ang="0">
+                    <a:pos x="connsiteX3" y="connsiteY3"/>
+                  </a:cxn>
+                  <a:cxn ang="0">
+                    <a:pos x="connsiteX4" y="connsiteY4"/>
+                  </a:cxn>
+                  <a:cxn ang="0">
+                    <a:pos x="connsiteX5" y="connsiteY5"/>
+                  </a:cxn>
+                  <a:cxn ang="0">
+                    <a:pos x="connsiteX6" y="connsiteY6"/>
+                  </a:cxn>
+                  <a:cxn ang="0">
+                    <a:pos x="connsiteX7" y="connsiteY7"/>
+                  </a:cxn>
+                  <a:cxn ang="0">
+                    <a:pos x="connsiteX8" y="connsiteY8"/>
+                  </a:cxn>
+                  <a:cxn ang="0">
+                    <a:pos x="connsiteX9" y="connsiteY9"/>
+                  </a:cxn>
+                  <a:cxn ang="0">
+                    <a:pos x="connsiteX10" y="connsiteY10"/>
+                  </a:cxn>
+                  <a:cxn ang="0">
+                    <a:pos x="connsiteX11" y="connsiteY11"/>
+                  </a:cxn>
+                  <a:cxn ang="0">
+                    <a:pos x="connsiteX12" y="connsiteY12"/>
+                  </a:cxn>
+                  <a:cxn ang="0">
+                    <a:pos x="connsiteX13" y="connsiteY13"/>
+                  </a:cxn>
+                  <a:cxn ang="0">
+                    <a:pos x="connsiteX14" y="connsiteY14"/>
+                  </a:cxn>
+                  <a:cxn ang="0">
+                    <a:pos x="connsiteX15" y="connsiteY15"/>
+                  </a:cxn>
+                  <a:cxn ang="0">
+                    <a:pos x="connsiteX16" y="connsiteY16"/>
+                  </a:cxn>
+                </a:cxnLst>
+                <a:rect l="l" t="t" r="r" b="b"/>
+                <a:pathLst>
+                  <a:path w="1142967" h="1371600">
+                    <a:moveTo>
+                      <a:pt x="1058418" y="742950"/>
+                    </a:moveTo>
+                    <a:lnTo>
+                      <a:pt x="746760" y="587502"/>
+                    </a:lnTo>
+                    <a:cubicBezTo>
+                      <a:pt x="725424" y="576834"/>
+                      <a:pt x="702564" y="571500"/>
+                      <a:pt x="678942" y="571500"/>
+                    </a:cubicBezTo>
+                    <a:lnTo>
+                      <a:pt x="609600" y="571500"/>
+                    </a:lnTo>
+                    <a:lnTo>
+                      <a:pt x="609600" y="114300"/>
+                    </a:lnTo>
+                    <a:cubicBezTo>
+                      <a:pt x="609600" y="51054"/>
+                      <a:pt x="558546" y="0"/>
+                      <a:pt x="495300" y="0"/>
+                    </a:cubicBezTo>
+                    <a:cubicBezTo>
+                      <a:pt x="432054" y="0"/>
+                      <a:pt x="381000" y="51054"/>
+                      <a:pt x="381000" y="114300"/>
+                    </a:cubicBezTo>
+                    <a:lnTo>
+                      <a:pt x="381000" y="932688"/>
+                    </a:lnTo>
+                    <a:lnTo>
+                      <a:pt x="133350" y="876300"/>
+                    </a:lnTo>
+                    <a:cubicBezTo>
+                      <a:pt x="108204" y="870966"/>
+                      <a:pt x="81534" y="878586"/>
+                      <a:pt x="63246" y="897636"/>
+                    </a:cubicBezTo>
+                    <a:lnTo>
+                      <a:pt x="0" y="961644"/>
+                    </a:lnTo>
+                    <a:lnTo>
+                      <a:pt x="345948" y="1326642"/>
+                    </a:lnTo>
+                    <a:cubicBezTo>
+                      <a:pt x="374904" y="1355598"/>
+                      <a:pt x="432816" y="1371600"/>
+                      <a:pt x="473202" y="1371600"/>
+                    </a:cubicBezTo>
+                    <a:lnTo>
+                      <a:pt x="942594" y="1371600"/>
+                    </a:lnTo>
+                    <a:cubicBezTo>
+                      <a:pt x="1018794" y="1371600"/>
+                      <a:pt x="1082802" y="1315974"/>
+                      <a:pt x="1093470" y="1240536"/>
+                    </a:cubicBezTo>
+                    <a:lnTo>
+                      <a:pt x="1141476" y="900684"/>
+                    </a:lnTo>
+                    <a:cubicBezTo>
+                      <a:pt x="1150620" y="835914"/>
+                      <a:pt x="1117092" y="772668"/>
+                      <a:pt x="1058418" y="742950"/>
+                    </a:cubicBezTo>
+                    <a:close/>
+                  </a:path>
+                </a:pathLst>
+              </a:custGeom>
+              <a:grpFill/>
+              <a:ln w="76200" cap="flat">
+                <a:noFill/>
+                <a:prstDash val="solid"/>
+                <a:miter/>
+              </a:ln>
+            </p:spPr>
+            <p:txBody>
+              <a:bodyPr rtlCol="0" anchor="ctr"/>
+              <a:lstStyle/>
+              <a:p>
+                <a:endParaRPr lang="zh-TW" altLang="en-US"/>
+              </a:p>
+            </p:txBody>
+          </p:sp>
+          <p:sp>
+            <p:nvSpPr>
+              <p:cNvPr id="17" name="手繪多邊形 16">
+                <a:extLst>
+                  <a:ext uri="{FF2B5EF4-FFF2-40B4-BE49-F238E27FC236}">
+                    <a16:creationId xmlns:a16="http://schemas.microsoft.com/office/drawing/2014/main" id="{D842FAB4-5BF1-0C49-76E2-31AE529792A0}"/>
+                  </a:ext>
+                </a:extLst>
+              </p:cNvPr>
+              <p:cNvSpPr/>
+              <p:nvPr/>
+            </p:nvSpPr>
+            <p:spPr>
+              <a:xfrm>
+                <a:off x="5140207" y="1138944"/>
+                <a:ext cx="1524000" cy="457200"/>
+              </a:xfrm>
+              <a:custGeom>
+                <a:avLst/>
+                <a:gdLst>
+                  <a:gd name="connsiteX0" fmla="*/ 1381506 w 1524000"/>
+                  <a:gd name="connsiteY0" fmla="*/ 218694 h 457200"/>
+                  <a:gd name="connsiteX1" fmla="*/ 762000 w 1524000"/>
+                  <a:gd name="connsiteY1" fmla="*/ 0 h 457200"/>
+                  <a:gd name="connsiteX2" fmla="*/ 142494 w 1524000"/>
+                  <a:gd name="connsiteY2" fmla="*/ 218694 h 457200"/>
+                  <a:gd name="connsiteX3" fmla="*/ 0 w 1524000"/>
+                  <a:gd name="connsiteY3" fmla="*/ 76200 h 457200"/>
+                  <a:gd name="connsiteX4" fmla="*/ 0 w 1524000"/>
+                  <a:gd name="connsiteY4" fmla="*/ 457200 h 457200"/>
+                  <a:gd name="connsiteX5" fmla="*/ 381000 w 1524000"/>
+                  <a:gd name="connsiteY5" fmla="*/ 457200 h 457200"/>
+                  <a:gd name="connsiteX6" fmla="*/ 223266 w 1524000"/>
+                  <a:gd name="connsiteY6" fmla="*/ 299466 h 457200"/>
+                  <a:gd name="connsiteX7" fmla="*/ 762000 w 1524000"/>
+                  <a:gd name="connsiteY7" fmla="*/ 114300 h 457200"/>
+                  <a:gd name="connsiteX8" fmla="*/ 1300734 w 1524000"/>
+                  <a:gd name="connsiteY8" fmla="*/ 299466 h 457200"/>
+                  <a:gd name="connsiteX9" fmla="*/ 1143000 w 1524000"/>
+                  <a:gd name="connsiteY9" fmla="*/ 457200 h 457200"/>
+                  <a:gd name="connsiteX10" fmla="*/ 1524000 w 1524000"/>
+                  <a:gd name="connsiteY10" fmla="*/ 457200 h 457200"/>
+                  <a:gd name="connsiteX11" fmla="*/ 1524000 w 1524000"/>
+                  <a:gd name="connsiteY11" fmla="*/ 76200 h 457200"/>
+                  <a:gd name="connsiteX12" fmla="*/ 1381506 w 1524000"/>
+                  <a:gd name="connsiteY12" fmla="*/ 218694 h 457200"/>
+                </a:gdLst>
+                <a:ahLst/>
+                <a:cxnLst>
+                  <a:cxn ang="0">
+                    <a:pos x="connsiteX0" y="connsiteY0"/>
+                  </a:cxn>
+                  <a:cxn ang="0">
+                    <a:pos x="connsiteX1" y="connsiteY1"/>
+                  </a:cxn>
+                  <a:cxn ang="0">
+                    <a:pos x="connsiteX2" y="connsiteY2"/>
+                  </a:cxn>
+                  <a:cxn ang="0">
+                    <a:pos x="connsiteX3" y="connsiteY3"/>
+                  </a:cxn>
+                  <a:cxn ang="0">
+                    <a:pos x="connsiteX4" y="connsiteY4"/>
+                  </a:cxn>
+                  <a:cxn ang="0">
+                    <a:pos x="connsiteX5" y="connsiteY5"/>
+                  </a:cxn>
+                  <a:cxn ang="0">
+                    <a:pos x="connsiteX6" y="connsiteY6"/>
+                  </a:cxn>
+                  <a:cxn ang="0">
+                    <a:pos x="connsiteX7" y="connsiteY7"/>
+                  </a:cxn>
+                  <a:cxn ang="0">
+                    <a:pos x="connsiteX8" y="connsiteY8"/>
+                  </a:cxn>
+                  <a:cxn ang="0">
+                    <a:pos x="connsiteX9" y="connsiteY9"/>
+                  </a:cxn>
+                  <a:cxn ang="0">
+                    <a:pos x="connsiteX10" y="connsiteY10"/>
+                  </a:cxn>
+                  <a:cxn ang="0">
+                    <a:pos x="connsiteX11" y="connsiteY11"/>
+                  </a:cxn>
+                  <a:cxn ang="0">
+                    <a:pos x="connsiteX12" y="connsiteY12"/>
+                  </a:cxn>
+                </a:cxnLst>
+                <a:rect l="l" t="t" r="r" b="b"/>
+                <a:pathLst>
+                  <a:path w="1524000" h="457200">
+                    <a:moveTo>
+                      <a:pt x="1381506" y="218694"/>
+                    </a:moveTo>
+                    <a:cubicBezTo>
+                      <a:pt x="1271778" y="89154"/>
+                      <a:pt x="1036320" y="0"/>
+                      <a:pt x="762000" y="0"/>
+                    </a:cubicBezTo>
+                    <a:cubicBezTo>
+                      <a:pt x="487680" y="0"/>
+                      <a:pt x="252222" y="89154"/>
+                      <a:pt x="142494" y="218694"/>
+                    </a:cubicBezTo>
+                    <a:lnTo>
+                      <a:pt x="0" y="76200"/>
+                    </a:lnTo>
+                    <a:lnTo>
+                      <a:pt x="0" y="457200"/>
+                    </a:lnTo>
+                    <a:lnTo>
+                      <a:pt x="381000" y="457200"/>
+                    </a:lnTo>
+                    <a:lnTo>
+                      <a:pt x="223266" y="299466"/>
+                    </a:lnTo>
+                    <a:cubicBezTo>
+                      <a:pt x="299466" y="201168"/>
+                      <a:pt x="505206" y="114300"/>
+                      <a:pt x="762000" y="114300"/>
+                    </a:cubicBezTo>
+                    <a:cubicBezTo>
+                      <a:pt x="1018794" y="114300"/>
+                      <a:pt x="1224534" y="201168"/>
+                      <a:pt x="1300734" y="299466"/>
+                    </a:cubicBezTo>
+                    <a:lnTo>
+                      <a:pt x="1143000" y="457200"/>
+                    </a:lnTo>
+                    <a:lnTo>
+                      <a:pt x="1524000" y="457200"/>
+                    </a:lnTo>
+                    <a:lnTo>
+                      <a:pt x="1524000" y="76200"/>
+                    </a:lnTo>
+                    <a:lnTo>
+                      <a:pt x="1381506" y="218694"/>
+                    </a:lnTo>
+                    <a:close/>
+                  </a:path>
+                </a:pathLst>
+              </a:custGeom>
+              <a:grpFill/>
+              <a:ln w="76200" cap="flat">
+                <a:noFill/>
+                <a:prstDash val="solid"/>
+                <a:miter/>
+              </a:ln>
+            </p:spPr>
+            <p:txBody>
+              <a:bodyPr rtlCol="0" anchor="ctr"/>
+              <a:lstStyle/>
+              <a:p>
+                <a:endParaRPr lang="zh-TW" altLang="en-US"/>
+              </a:p>
+            </p:txBody>
+          </p:sp>
+        </p:grpSp>
+        <p:sp>
+          <p:nvSpPr>
+            <p:cNvPr id="21" name="文字方塊 20">
+              <a:extLst>
+                <a:ext uri="{FF2B5EF4-FFF2-40B4-BE49-F238E27FC236}">
+                  <a16:creationId xmlns:a16="http://schemas.microsoft.com/office/drawing/2014/main" id="{3B6DF32B-EE74-5BDF-5D5C-E6AD35F714F5}"/>
+                </a:ext>
+              </a:extLst>
+            </p:cNvPr>
+            <p:cNvSpPr txBox="1"/>
+            <p:nvPr/>
+          </p:nvSpPr>
+          <p:spPr>
+            <a:xfrm>
+              <a:off x="4980688" y="5651053"/>
+              <a:ext cx="2501326" cy="369332"/>
+            </a:xfrm>
+            <a:prstGeom prst="rect">
+              <a:avLst/>
+            </a:prstGeom>
+            <a:noFill/>
+          </p:spPr>
+          <p:txBody>
+            <a:bodyPr wrap="none" rtlCol="0">
+              <a:spAutoFit/>
+            </a:bodyPr>
+            <a:lstStyle/>
+            <a:p>
+              <a:pPr marL="7938"/>
+              <a:r>
+                <a:rPr kumimoji="1" lang="zh-TW" altLang="en-US" dirty="0">
+                  <a:solidFill>
+                    <a:srgbClr val="A16B40"/>
+                  </a:solidFill>
+                  <a:latin typeface="Heiti TC Medium" pitchFamily="2" charset="-128"/>
+                  <a:ea typeface="Heiti TC Medium" pitchFamily="2" charset="-128"/>
+                </a:rPr>
+                <a:t>左右滑動，切換前後隻</a:t>
+              </a:r>
+              <a:endParaRPr kumimoji="1" lang="en-US" altLang="zh-TW" dirty="0">
+                <a:solidFill>
+                  <a:srgbClr val="A16B40"/>
+                </a:solidFill>
+                <a:latin typeface="Heiti TC Medium" pitchFamily="2" charset="-128"/>
+                <a:ea typeface="Heiti TC Medium" pitchFamily="2" charset="-128"/>
+              </a:endParaRPr>
+            </a:p>
+          </p:txBody>
+        </p:sp>
+      </p:grpSp>
+    </p:spTree>
+    <p:extLst>
+      <p:ext uri="{BB962C8B-B14F-4D97-AF65-F5344CB8AC3E}">
+        <p14:creationId xmlns:p14="http://schemas.microsoft.com/office/powerpoint/2010/main" val="4026685657"/>
+      </p:ext>
+    </p:extLst>
+  </p:cSld>
+  <p:clrMapOvr>
+    <a:masterClrMapping/>
+  </p:clrMapOvr>
+</p:sld>
+</file>
+
 <file path=ppt/theme/theme1.xml><?xml version="1.0" encoding="utf-8"?>
 <a:theme xmlns:a="http://schemas.openxmlformats.org/drawingml/2006/main" name="Office 佈景主題 2013 - 2022">
   <a:themeElements>

</xml_diff>